<commit_message>
[MOD]add one more slide, ready to specify the flow
</commit_message>
<xml_diff>
--- a/issueImages/web context loading process.pptx
+++ b/issueImages/web context loading process.pptx
@@ -5,15 +5,16 @@
     <p:sldMasterId id="2147483648" r:id="rId1"/>
   </p:sldMasterIdLst>
   <p:notesMasterIdLst>
-    <p:notesMasterId r:id="rId8"/>
+    <p:notesMasterId r:id="rId9"/>
   </p:notesMasterIdLst>
   <p:sldIdLst>
     <p:sldId id="260" r:id="rId2"/>
     <p:sldId id="259" r:id="rId3"/>
     <p:sldId id="262" r:id="rId4"/>
-    <p:sldId id="264" r:id="rId5"/>
-    <p:sldId id="263" r:id="rId6"/>
-    <p:sldId id="258" r:id="rId7"/>
+    <p:sldId id="265" r:id="rId5"/>
+    <p:sldId id="264" r:id="rId6"/>
+    <p:sldId id="263" r:id="rId7"/>
+    <p:sldId id="258" r:id="rId8"/>
   </p:sldIdLst>
   <p:sldSz cx="9144000" cy="5143500" type="screen16x9"/>
   <p:notesSz cx="6858000" cy="9144000"/>
@@ -260,16 +261,16 @@
   <inkml:trace contextRef="#ctx0" brushRef="#br0" timeOffset="2875">13745 10120,'0'0,"0"27,0 39,0-13,0 0,0 0,0-27,0 27,0-13,0-40,0 26,0-13,0-13,13 0,1 0,12 0,0 0,-12 0,12 0,-13-13,1-26,-14 39,0-27</inkml:trace>
   <inkml:trace contextRef="#ctx0" brushRef="#br0" timeOffset="3875">13586 10186,'0'0,"53"0,0 0,13 0,14 0,-27 0,26 0,-39 0,-1 0,1 0,-40 0,13 0,1 0,-14 0,-14 0,1 0,-13 0,26 14,-40-1,40 0,-13 0,13-13,0 14,0-1,0 0,0-13,0 13,0 1,0-1,0 0,13-13,27 13,-1 0,-25 1,-1-14,-13 0,13 0,-13 13,0 0,13 0,-13 1,0-1,0 0,0 0,0 1,0-14,0 26,-26-26,26 0,-13 0,-1 26,-12-26,13 14,-1-1</inkml:trace>
   <inkml:trace contextRef="#ctx0" brushRef="#br0" timeOffset="9786">12753 10081,'0'0,"0"13,0 0,0 0,0-13,0 14,0 12,0-26,0 26,0-12,0-1,0 13,0-12,0 12,0-13,0 14,0-14,0 0,0 0,0 1,0-1,0-13,0 13,0 0,0 1,0-14,0 13,0 0,0 0,0-13,0 14,0-1,0 0,0 0,0 0,0 1,0-14,0 13</inkml:trace>
-  <inkml:trace contextRef="#ctx0" brushRef="#br0" timeOffset="34137.6629">11655 10001,'0'27,"0"-1,0-13,0 27,-13 13,-1-27,-12 27,26-13,0 13,0-27,0 1,0 13,0-27,0 0,0 14,13-14,14 0,12 0,-12 14,13-14,12 13,-38-12,39-1,-14 0,14 13,-13-12,-14-14</inkml:trace>
+  <inkml:trace contextRef="#ctx0" brushRef="#br0" timeOffset="34137.6628">11655 10001,'0'27,"0"-1,0-13,0 27,-13 13,-1-27,-12 27,26-13,0 13,0-27,0 1,0 13,0-27,0 0,0 14,13-14,14 0,12 0,-12 14,13-14,12 13,-38-12,39-1,-14 0,14 13,-13-12,-14-14</inkml:trace>
   <inkml:trace contextRef="#ctx0" brushRef="#br0" timeOffset="35144.5623">14340 10014,'0'0,"27"0,-14 27,0-1,1 1,-14-14,13-13,-13 0,13 0,0 0</inkml:trace>
   <inkml:trace contextRef="#ctx0" brushRef="#br0" timeOffset="35767.5">14777 10041,'0'0,"0"0,0 0,-26 0,-1 13,14-13,0 13,-14 14,14-27,13 0,-27 26,1-12,13-1,-27-13,0 13,14 0,-40 0,39-13,14 14,0-14,13 13,13-13,0 0,40 0,0 0,27 0,25 0,-38 0,12 0,-26 0,-14 0,-25 0,-14 0,0-13,0-1,0 14,-40-13,14-13</inkml:trace>
-  <inkml:trace contextRef="#ctx0" brushRef="#br0" timeOffset="38048.2718">14737 9935,'-13'-13,"0"13,13 40,0-1,-27 27,27-13,-13 40,13 0,0-1,0-39,0 26,0-39,0-27,0-13,0 27,-13-27,13-27,-27-26,14 1,0 12,13 0,0 0,-13 1,13 39,0-13,0 13,-13 0,-1 26,1 14,-27 26,40-53,-13 27,-27 13,27-40,13 0,0 0,0-13,0-26,0-14,40 1,-14 25,1-25,13 25,-1 14,-12 0,-1 0,-13 0,14 0,-14 0,14 0,-14 0,26 0,-25 27,-1-27,13 26,-12 1,-14-27,0 0,-14 0,1 0,-13 0,12 0,-12 0,26 0,-13 0,-14 0,27 0,-26 13,13 13,-14 1,14-1,-27 1,27-1,-13-26,-1 27,1-27,12 0,14 0,14 0,-1 0,0 0,0 0,1 0,12-14,-26 14,-13 0,-14 0,-26 0,14 0,-1 0,14 0,-1 0,1 14,12-1,1-13,13 0,27 0,26 0,39 0,-12 0,39 0,13-13,-66 13,13-27,-12 27,-41 0,-39-13,-14 0,-12 0,12-1,-13 14,1-26,12 13,1 13,13-14,13 14,-27 0,27 0,-13 0,13 0,-26 0,-1 27,14-27,0 26,-1 1,14 12,0 1,-13-27,-13 27,26-27,0 1,0-14,-14 0,1 0,-13 0,26 0,0-14,13 1,-13 0,26 13,-12-13,12 13,1 0,12 0,1 0,-27 0,27 0,-27 0,27 0,-40 13,39 13,-12-12,-14-14,0 0,-13 0,14 0,-1-40,27 0</inkml:trace>
-  <inkml:trace contextRef="#ctx0" brushRef="#br0" timeOffset="38711.2055">15412 10094,'0'0,"-13"0,0 53,-14-27,1 14,-1 13,-13 13,-12-13,12 13,13-26,1-14,-1 1,14-1,0-13,13-13,0-39,26-1,14 27,-13-14,12 14,-25 0,12 0,0 13,-26 13,0 0,0 27,0-14,14-13,-14 40,0-13,0-27,0 27,0 0,0-14,0 1,0-1,0-13,0-26,13-40,0 13,14-13,12-26</inkml:trace>
+  <inkml:trace contextRef="#ctx0" brushRef="#br0" timeOffset="38048.2716">14737 9935,'-13'-13,"0"13,13 40,0-1,-27 27,27-13,-13 40,13 0,0-1,0-39,0 26,0-39,0-27,0-13,0 27,-13-27,13-27,-27-26,14 1,0 12,13 0,0 0,-13 1,13 39,0-13,0 13,-13 0,-1 26,1 14,-27 26,40-53,-13 27,-27 13,27-40,13 0,0 0,0-13,0-26,0-14,40 1,-14 25,1-25,13 25,-1 14,-12 0,-1 0,-13 0,14 0,-14 0,14 0,-14 0,26 0,-25 27,-1-27,13 26,-12 1,-14-27,0 0,-14 0,1 0,-13 0,12 0,-12 0,26 0,-13 0,-14 0,27 0,-26 13,13 13,-14 1,14-1,-27 1,27-1,-13-26,-1 27,1-27,12 0,14 0,14 0,-1 0,0 0,0 0,1 0,12-14,-26 14,-13 0,-14 0,-26 0,14 0,-1 0,14 0,-1 0,1 14,12-1,1-13,13 0,27 0,26 0,39 0,-12 0,39 0,13-13,-66 13,13-27,-12 27,-41 0,-39-13,-14 0,-12 0,12-1,-13 14,1-26,12 13,1 13,13-14,13 14,-27 0,27 0,-13 0,13 0,-26 0,-1 27,14-27,0 26,-1 1,14 12,0 1,-13-27,-13 27,26-27,0 1,0-14,-14 0,1 0,-13 0,26 0,0-14,13 1,-13 0,26 13,-12-13,12 13,1 0,12 0,1 0,-27 0,27 0,-27 0,27 0,-40 13,39 13,-12-12,-14-14,0 0,-13 0,14 0,-1-40,27 0</inkml:trace>
+  <inkml:trace contextRef="#ctx0" brushRef="#br0" timeOffset="38711.2053">15412 10094,'0'0,"-13"0,0 53,-14-27,1 14,-1 13,-13 13,-12-13,12 13,13-26,1-14,-1 1,14-1,0-13,13-13,0-39,26-1,14 27,-13-14,12 14,-25 0,12 0,0 13,-26 13,0 0,0 27,0-14,14-13,-14 40,0-13,0-27,0 27,0 0,0-14,0 1,0-1,0-13,0-26,13-40,0 13,14-13,12-26</inkml:trace>
   <inkml:trace contextRef="#ctx0" brushRef="#br0" timeOffset="38968.1798">15425 10464,'13'0,"-13"27,0-14,0 13,0-12,0-1,0 0,14 0,-1-13,0 0,14-26,-14-1,0-25</inkml:trace>
   <inkml:trace contextRef="#ctx0" brushRef="#br0" timeOffset="39656.111">15650 10332,'0'0,"0"13,0 0,0 1,0 25,0-39,0 14,0 12,0-13,-13 1,0-1,-1 0,1 27,13-40,-13 26,-13 14,12-40,14 13,0 13,-13-26,13 0,0 0,0-13,0 13,0-13,0 0,27 13,-14 0,13 0,-13 0,-13 0,27 0,-14 0,-13 0,27 0,-1 0,-26 0,26 0,-12 0,25 0,1 13,-27-13,14 13,-14-13,0 0,-13 0,13 0,-13-13,0-13</inkml:trace>
   <inkml:trace contextRef="#ctx0" brushRef="#br0" timeOffset="40296.047">15928 10200,'13'0,"0"0,-13 0,14 0,12 0,-26 0,27 13,-14 0,0 0,0 1,-13-1,27 13,-14-12,-13 12,13 0,14-12,-27 12,0-13,0 1,13-1,-13 0,0 0,0 14,0-1,0-26,0 27,0-1,0-26,0 13,0 1,0 12,0 0,0-26,0 27,0-14,0-13,-13 27,13-1,-14-26,14 13,-26 27,26-40,-13 13,-27 0,0 14,14-14,-14 14,-13-14,-53 27,40-40,-13 39,-27 14</inkml:trace>
   <inkml:trace contextRef="#ctx0" brushRef="#br0" timeOffset="43670.7095">6416 11893,'0'-26,"0"26,0-14,0 14,-26 0,-1-13,-26 13,-26 0,-27 0,-39 0,-14 0,-53 0,-13 0,27 0,-1 0,14 0,26 0,14 0,52 0,-13 0,14 0,-27 0,53 0,0 0,-1 27,1-1,-13 14,26-14,0 14,-13 0,26-1,27-26,13-13,-13 27,-1-14,1 0,0 1,-13 12,26-13,-27 14,1-1,-1 1,27-14,-13 27,0-27,13 13,0 1,-13-1,13-13,0 27,0 0,0-27,0 27,0-27,0 40,0-27,0 27,0-40,0 27,0 0,0-14,13 54,0-14,13 0,14 0,-13-13,25 26,-12-39,0 13,39 0,1-13,-14 13,13-14,1-26,39 27,-14-27,-12 1,-80-14,-13 0,185 0,14 0,52 0,54 13,-41-13,-13 0,-26 0,0 0,-66 0,0 0,-27 0,0 0,-39 0,0-40,-14 27,14-27,-54 27,41-13,-14-27,13 0,-26 26,-13-26,-14-26,1 0,-14-14,-13-13,0 14,0-67,-13 26,-54 1,-25-13,12-1,-12 14,-27 13,0 39,13 1,-92 0,12 13,-39-1,-26 28,0-14,-1 53,-131-13,118 13,53 0,14 0,-80 0,80 0,79 0,0 0,26 26,14-13,39 0,0 1,14-1,-14-13</inkml:trace>
-  <inkml:trace contextRef="#ctx0" brushRef="#br0" timeOffset="45519.5246">6945 11695,'-13'0,"13"-14,0 1,0 0,13-14,-13-12,14-1,-14 0,26-13,0-26,-12-14,25-12,-25 52,-1-27,27 1,-27 0,13-14,1 14,-1-14,1 0,-14 27,13 13,14-13,-27 40,14-40,-14 39,0 14,0-27,1-13,-1 27,0-14,0-26,0 26,1 27,-1-40,0 40,0 0,1-14,-1 14,27-40,-40 53,26-26,-13-1,0 27,-13-26,27 13,-27-1,0 14,13-13,0 0,1 0,-1-1,-13 1,13 13,14-13,-27 13,26-13,0-1,-12 14,-1-13,-13 13,26-13,-12 0,-1 0,-13 13,0 26</inkml:trace>
+  <inkml:trace contextRef="#ctx0" brushRef="#br0" timeOffset="45519.5245">6945 11695,'-13'0,"13"-14,0 1,0 0,13-14,-13-12,14-1,-14 0,26-13,0-26,-12-14,25-12,-25 52,-1-27,27 1,-27 0,13-14,1 14,-1-14,1 0,-14 27,13 13,14-13,-27 40,14-40,-14 39,0 14,0-27,1-13,-1 27,0-14,0-26,0 26,1 27,-1-40,0 40,0 0,1-14,-1 14,27-40,-40 53,26-26,-13-1,0 27,-13-26,27 13,-27-1,0 14,13-13,0 0,1 0,-1-1,-13 1,13 13,14-13,-27 13,26-13,0-1,-12 14,-1-13,-13 13,26-13,-12 0,-1 0,-13 13,0 26</inkml:trace>
   <inkml:trace contextRef="#ctx0" brushRef="#br0" timeOffset="46839.3926">7977 10147,'13'0,"-13"13,0 13,-13-12,13 25,-13-12,-13 13,26-14,-14 0,1 1,-13 13,26-27,0 0,-14 14,1-1,0 0,0-12,-1 25,14-39,-13 14,0-1,0 0,13 0,0 14,-27-14,27 0,-13 14,0-14,0 27,-14-27,14 26,0-12,-1-14,14 0,-13 27,-26-13,39-1,-14 14,-12-14,13-13,-1 14,1-1,0-13,-14 40,14-39,0 12,13-13,-13 27,-14-14,27 1,-13-1,0 1,0-1,-1-12,1 12,0-13,0 0,-1 14,1-1,0-12,13-14,-26 26,26-26,-14 13,14-13,-13 0,0 14,13-14,0 13,-13 0,-14 0,14 14,-13-27,26 0,-27 13,27-13,-13 13,-14-13,27 13,-13-13,0 0,0 0,-1 0,1 0,0 0,0 0</inkml:trace>
   <inkml:trace contextRef="#ctx0" brushRef="#br0" timeOffset="47750.3016">6773 11284,'0'0,"14"0,-1 0,-13 40,0 13,26-13,-26 13,13-27,-13 14,0 0,0-14,0 14,14-27,-14 0,0-13,13 27,-13-14,0 0,0-13,0 13,0 1,13-1,0-13,54 0,12 0,27 0,13 0,13 0,-13 0,-26 0,-1 0,-12 0,-41 0,-39 0,27 0,-27 0,13 0</inkml:trace>
   <inkml:trace contextRef="#ctx0" brushRef="#br0" timeOffset="67972.2792">11906 9022,'0'0,"0"0,0 40,0-27,0 14,0 12,0-12,0 13,0-14,0 0,0 14,0-27,0 1,0-1,0 0,13 0,1-13</inkml:trace>
@@ -377,7 +378,7 @@
           <a:p>
             <a:fld id="{62974DE1-0086-46B2-AAC4-46D2360602FF}" type="datetimeFigureOut">
               <a:rPr lang="zh-CN" altLang="en-US" smtClean="0"/>
-              <a:t>2017/5/8</a:t>
+              <a:t>2017/7/20</a:t>
             </a:fld>
             <a:endParaRPr lang="zh-CN" altLang="en-US"/>
           </a:p>
@@ -952,7 +953,7 @@
           <a:lstStyle/>
           <a:p>
             <a:r>
-              <a:rPr lang="en-US" altLang="zh-CN" dirty="0" err="1" smtClean="0"/>
+              <a:rPr lang="en-US" altLang="zh-CN" dirty="0" smtClean="0"/>
               <a:t>DispatcherServlet</a:t>
             </a:r>
             <a:r>
@@ -1111,7 +1112,7 @@
           <a:lstStyle/>
           <a:p>
             <a:r>
-              <a:rPr lang="en-US" altLang="zh-CN" dirty="0" err="1" smtClean="0"/>
+              <a:rPr lang="en-US" altLang="zh-CN" dirty="0" smtClean="0"/>
               <a:t>DispatcherServlet</a:t>
             </a:r>
             <a:r>
@@ -1252,12 +1253,7 @@
             <p:ph type="sldImg"/>
           </p:nvPr>
         </p:nvSpPr>
-        <p:spPr>
-          <a:xfrm>
-            <a:off x="381000" y="685800"/>
-            <a:ext cx="6096000" cy="3429000"/>
-          </a:xfrm>
-        </p:spPr>
+        <p:spPr/>
       </p:sp>
       <p:sp>
         <p:nvSpPr>
@@ -1275,62 +1271,12 @@
           <a:lstStyle/>
           <a:p>
             <a:r>
-              <a:rPr lang="en-US" altLang="zh-CN" dirty="0" err="1" smtClean="0"/>
-              <a:t>ContextLoaderListener</a:t>
+              <a:rPr lang="en-US" altLang="zh-CN" dirty="0" smtClean="0"/>
+              <a:t>DispatcherServlet</a:t>
             </a:r>
             <a:r>
               <a:rPr lang="zh-CN" altLang="en-US" dirty="0" smtClean="0"/>
-              <a:t>初始化的上下文加载的</a:t>
-            </a:r>
-            <a:r>
-              <a:rPr lang="en-US" altLang="zh-CN" dirty="0" smtClean="0"/>
-              <a:t>Bean</a:t>
-            </a:r>
-            <a:r>
-              <a:rPr lang="zh-CN" altLang="en-US" dirty="0" smtClean="0"/>
-              <a:t>是对于整个应用程序共享的，不管是使用什么表现层技术，一般如</a:t>
-            </a:r>
-            <a:r>
-              <a:rPr lang="en-US" altLang="zh-CN" dirty="0" smtClean="0"/>
-              <a:t>DAO</a:t>
-            </a:r>
-            <a:r>
-              <a:rPr lang="zh-CN" altLang="en-US" dirty="0" smtClean="0"/>
-              <a:t>层、</a:t>
-            </a:r>
-            <a:r>
-              <a:rPr lang="en-US" altLang="zh-CN" dirty="0" smtClean="0"/>
-              <a:t>Service</a:t>
-            </a:r>
-            <a:r>
-              <a:rPr lang="zh-CN" altLang="en-US" dirty="0" smtClean="0"/>
-              <a:t>层</a:t>
-            </a:r>
-            <a:r>
-              <a:rPr lang="en-US" altLang="zh-CN" dirty="0" smtClean="0"/>
-              <a:t>Bean</a:t>
-            </a:r>
-            <a:r>
-              <a:rPr lang="zh-CN" altLang="en-US" dirty="0" smtClean="0"/>
-              <a:t>；</a:t>
-            </a:r>
-          </a:p>
-          <a:p>
-            <a:r>
-              <a:rPr lang="en-US" altLang="zh-CN" dirty="0" err="1" smtClean="0"/>
-              <a:t>DispatcherServlet</a:t>
-            </a:r>
-            <a:r>
-              <a:rPr lang="zh-CN" altLang="en-US" dirty="0" smtClean="0"/>
-              <a:t>初始化的上下文加载的</a:t>
-            </a:r>
-            <a:r>
-              <a:rPr lang="en-US" altLang="zh-CN" dirty="0" smtClean="0"/>
-              <a:t>Bean</a:t>
-            </a:r>
-            <a:r>
-              <a:rPr lang="zh-CN" altLang="en-US" dirty="0" smtClean="0"/>
-              <a:t>是只对</a:t>
+              <a:t>是前端控制器设计模式的实现，提供</a:t>
             </a:r>
             <a:r>
               <a:rPr lang="en-US" altLang="zh-CN" dirty="0" smtClean="0"/>
@@ -1338,158 +1284,68 @@
             </a:r>
             <a:r>
               <a:rPr lang="zh-CN" altLang="en-US" dirty="0" smtClean="0"/>
-              <a:t>有效的</a:t>
+              <a:t>的集中访问点，而且负责职责的分派，而且与</a:t>
             </a:r>
             <a:r>
               <a:rPr lang="en-US" altLang="zh-CN" dirty="0" smtClean="0"/>
-              <a:t>Bean</a:t>
+              <a:t>Spring </a:t>
+            </a:r>
+            <a:r>
+              <a:rPr lang="en-US" altLang="zh-CN" dirty="0" err="1" smtClean="0"/>
+              <a:t>IoC</a:t>
             </a:r>
             <a:r>
               <a:rPr lang="zh-CN" altLang="en-US" dirty="0" smtClean="0"/>
-              <a:t>，如</a:t>
+              <a:t>容器无缝集成，从而可以获得</a:t>
             </a:r>
             <a:r>
               <a:rPr lang="en-US" altLang="zh-CN" dirty="0" smtClean="0"/>
-              <a:t>Controller</a:t>
+              <a:t>Spring</a:t>
             </a:r>
             <a:r>
               <a:rPr lang="zh-CN" altLang="en-US" dirty="0" smtClean="0"/>
-              <a:t>、</a:t>
-            </a:r>
-            <a:r>
-              <a:rPr lang="en-US" altLang="zh-CN" dirty="0" smtClean="0"/>
-              <a:t>HandlerMapping</a:t>
+              <a:t>的所有好处。</a:t>
+            </a:r>
+            <a:endParaRPr lang="en-US" altLang="zh-CN" dirty="0" smtClean="0"/>
+          </a:p>
+          <a:p>
+            <a:r>
+              <a:rPr lang="en-US" altLang="zh-CN" sz="1200" dirty="0" smtClean="0"/>
+              <a:t>HandlerAdapter</a:t>
             </a:r>
             <a:r>
               <a:rPr lang="zh-CN" altLang="en-US" dirty="0" smtClean="0"/>
-              <a:t>、</a:t>
-            </a:r>
-            <a:r>
-              <a:rPr lang="en-US" altLang="zh-CN" dirty="0" smtClean="0"/>
+              <a:t>可以有多个，比如用于拦截权限（</a:t>
+            </a:r>
+            <a:r>
+              <a:rPr lang="en-US" altLang="zh-CN" sz="1200" b="0" i="0" kern="1200" dirty="0" smtClean="0">
+                <a:solidFill>
+                  <a:schemeClr val="tx1"/>
+                </a:solidFill>
+                <a:effectLst/>
+                <a:latin typeface="+mn-lt"/>
+                <a:ea typeface="+mn-ea"/>
+                <a:cs typeface="+mn-cs"/>
+              </a:rPr>
               <a:t>HandlerAdapter</a:t>
             </a:r>
             <a:r>
+              <a:rPr lang="zh-CN" altLang="en-US" sz="1200" b="0" i="0" kern="1200" dirty="0" smtClean="0">
+                <a:solidFill>
+                  <a:schemeClr val="tx1"/>
+                </a:solidFill>
+                <a:effectLst/>
+                <a:latin typeface="+mn-lt"/>
+                <a:ea typeface="+mn-ea"/>
+                <a:cs typeface="+mn-cs"/>
+              </a:rPr>
+              <a:t>将会把处理器包装为适配器，从而支持多种类型的处理器，即适配器设计模式的应用，从而很容易支持很多类型的处理器</a:t>
+            </a:r>
+            <a:r>
               <a:rPr lang="zh-CN" altLang="en-US" dirty="0" smtClean="0"/>
-              <a:t>等等，该初始化上下文应该只加载</a:t>
-            </a:r>
-            <a:r>
-              <a:rPr lang="en-US" altLang="zh-CN" dirty="0" smtClean="0"/>
-              <a:t>Web</a:t>
-            </a:r>
-            <a:r>
-              <a:rPr lang="zh-CN" altLang="en-US" dirty="0" smtClean="0"/>
-              <a:t>相关组件。</a:t>
-            </a:r>
-            <a:endParaRPr lang="en-US" altLang="zh-CN" dirty="0" smtClean="0"/>
-          </a:p>
-          <a:p>
-            <a:r>
-              <a:rPr lang="en-US" altLang="zh-CN" dirty="0" smtClean="0"/>
-              <a:t>Web</a:t>
-            </a:r>
-            <a:r>
-              <a:rPr lang="zh-CN" altLang="en-US" dirty="0" smtClean="0"/>
-              <a:t>层组件和</a:t>
-            </a:r>
-            <a:r>
-              <a:rPr lang="en-US" altLang="zh-CN" dirty="0" smtClean="0"/>
-              <a:t>web</a:t>
-            </a:r>
-            <a:r>
-              <a:rPr lang="zh-CN" altLang="en-US" dirty="0" smtClean="0"/>
-              <a:t>层之外的组件分开加载，是因为没有</a:t>
-            </a:r>
-            <a:r>
-              <a:rPr lang="en-US" altLang="zh-CN" dirty="0" err="1" smtClean="0"/>
-              <a:t>springMVC</a:t>
-            </a:r>
-            <a:r>
-              <a:rPr lang="zh-CN" altLang="en-US" dirty="0" smtClean="0"/>
-              <a:t>的时候，</a:t>
-            </a:r>
-            <a:r>
-              <a:rPr lang="en-US" altLang="zh-CN" dirty="0" smtClean="0"/>
-              <a:t>struts</a:t>
-            </a:r>
-            <a:r>
-              <a:rPr lang="zh-CN" altLang="en-US" dirty="0" smtClean="0"/>
-              <a:t>完成了</a:t>
-            </a:r>
-            <a:r>
-              <a:rPr lang="en-US" altLang="zh-CN" dirty="0" smtClean="0"/>
-              <a:t>web</a:t>
-            </a:r>
-            <a:r>
-              <a:rPr lang="zh-CN" altLang="en-US" dirty="0" smtClean="0"/>
-              <a:t>层的加载。</a:t>
-            </a:r>
-            <a:endParaRPr lang="en-US" altLang="zh-CN" dirty="0" smtClean="0"/>
-          </a:p>
-          <a:p>
-            <a:r>
-              <a:rPr lang="en-US" altLang="zh-CN" dirty="0" err="1" smtClean="0"/>
-              <a:t>Application.properties</a:t>
-            </a:r>
-            <a:r>
-              <a:rPr lang="zh-CN" altLang="en-US" dirty="0" smtClean="0"/>
-              <a:t>的解析由</a:t>
-            </a:r>
-            <a:r>
-              <a:rPr lang="en-US" altLang="zh-CN" dirty="0" err="1" smtClean="0"/>
-              <a:t>ContextLoaderListener</a:t>
-            </a:r>
-            <a:r>
-              <a:rPr lang="zh-CN" altLang="en-US" dirty="0" smtClean="0"/>
-              <a:t>和</a:t>
-            </a:r>
-            <a:r>
-              <a:rPr lang="en-US" altLang="zh-CN" dirty="0" err="1" smtClean="0"/>
-              <a:t>DispatcherServlet</a:t>
-            </a:r>
-            <a:r>
-              <a:rPr lang="zh-CN" altLang="en-US" dirty="0" smtClean="0"/>
-              <a:t>共同完成。</a:t>
-            </a:r>
-            <a:endParaRPr lang="en-US" altLang="zh-CN" dirty="0" smtClean="0"/>
-          </a:p>
-          <a:p>
-            <a:r>
-              <a:rPr lang="zh-CN" altLang="en-US" dirty="0" smtClean="0"/>
-              <a:t>如果没有</a:t>
-            </a:r>
-            <a:r>
-              <a:rPr lang="en-US" altLang="zh-CN" dirty="0" smtClean="0"/>
-              <a:t>springboot</a:t>
-            </a:r>
-            <a:r>
-              <a:rPr lang="zh-CN" altLang="en-US" dirty="0" smtClean="0"/>
-              <a:t>：绿色的部分的集成就没有了，通过</a:t>
-            </a:r>
-            <a:r>
-              <a:rPr lang="en-US" altLang="zh-CN" dirty="0" smtClean="0"/>
-              <a:t>web.xml</a:t>
-            </a:r>
-            <a:r>
-              <a:rPr lang="zh-CN" altLang="en-US" dirty="0" smtClean="0"/>
-              <a:t>配置的</a:t>
-            </a:r>
-            <a:r>
-              <a:rPr lang="en-US" altLang="zh-CN" dirty="0" err="1" smtClean="0"/>
-              <a:t>contextLoaderLisener</a:t>
-            </a:r>
-            <a:r>
-              <a:rPr lang="zh-CN" altLang="en-US" dirty="0" smtClean="0"/>
-              <a:t>加载</a:t>
-            </a:r>
-            <a:r>
-              <a:rPr lang="en-US" altLang="zh-CN" dirty="0" smtClean="0"/>
-              <a:t>spring</a:t>
-            </a:r>
-            <a:r>
-              <a:rPr lang="zh-CN" altLang="en-US" dirty="0" smtClean="0"/>
-              <a:t>上下文，嵌入的东西都独立出来了。</a:t>
-            </a:r>
-            <a:endParaRPr lang="en-US" altLang="zh-CN" dirty="0" smtClean="0"/>
+              <a:t>）</a:t>
+            </a:r>
+            <a:endParaRPr lang="zh-CN" altLang="en-US" dirty="0"/>
           </a:p>
         </p:txBody>
       </p:sp>
@@ -1519,7 +1375,7 @@
     </p:spTree>
     <p:extLst>
       <p:ext uri="{BB962C8B-B14F-4D97-AF65-F5344CB8AC3E}">
-        <p14:creationId xmlns:p14="http://schemas.microsoft.com/office/powerpoint/2010/main" val="1421662787"/>
+        <p14:creationId xmlns:p14="http://schemas.microsoft.com/office/powerpoint/2010/main" val="132108948"/>
       </p:ext>
     </p:extLst>
   </p:cSld>
@@ -1621,7 +1477,7 @@
           </a:p>
           <a:p>
             <a:r>
-              <a:rPr lang="en-US" altLang="zh-CN" dirty="0" err="1" smtClean="0"/>
+              <a:rPr lang="en-US" altLang="zh-CN" dirty="0" smtClean="0"/>
               <a:t>DispatcherServlet</a:t>
             </a:r>
             <a:r>
@@ -1684,7 +1540,116 @@
               <a:rPr lang="zh-CN" altLang="en-US" dirty="0" smtClean="0"/>
               <a:t>相关组件。</a:t>
             </a:r>
-            <a:endParaRPr lang="zh-CN" altLang="en-US" dirty="0"/>
+            <a:endParaRPr lang="en-US" altLang="zh-CN" dirty="0" smtClean="0"/>
+          </a:p>
+          <a:p>
+            <a:r>
+              <a:rPr lang="en-US" altLang="zh-CN" dirty="0" smtClean="0"/>
+              <a:t>Web</a:t>
+            </a:r>
+            <a:r>
+              <a:rPr lang="zh-CN" altLang="en-US" dirty="0" smtClean="0"/>
+              <a:t>层组件和</a:t>
+            </a:r>
+            <a:r>
+              <a:rPr lang="en-US" altLang="zh-CN" dirty="0" smtClean="0"/>
+              <a:t>web</a:t>
+            </a:r>
+            <a:r>
+              <a:rPr lang="zh-CN" altLang="en-US" dirty="0" smtClean="0"/>
+              <a:t>层之外的组件分开加载，是因为没有</a:t>
+            </a:r>
+            <a:r>
+              <a:rPr lang="en-US" altLang="zh-CN" dirty="0" err="1" smtClean="0"/>
+              <a:t>springMVC</a:t>
+            </a:r>
+            <a:r>
+              <a:rPr lang="zh-CN" altLang="en-US" dirty="0" smtClean="0"/>
+              <a:t>的时候，</a:t>
+            </a:r>
+            <a:r>
+              <a:rPr lang="en-US" altLang="zh-CN" dirty="0" smtClean="0"/>
+              <a:t>struts</a:t>
+            </a:r>
+            <a:r>
+              <a:rPr lang="zh-CN" altLang="en-US" dirty="0" smtClean="0"/>
+              <a:t>完成了</a:t>
+            </a:r>
+            <a:r>
+              <a:rPr lang="en-US" altLang="zh-CN" dirty="0" smtClean="0"/>
+              <a:t>web</a:t>
+            </a:r>
+            <a:r>
+              <a:rPr lang="zh-CN" altLang="en-US" dirty="0" smtClean="0"/>
+              <a:t>层的加载。</a:t>
+            </a:r>
+            <a:endParaRPr lang="en-US" altLang="zh-CN" dirty="0" smtClean="0"/>
+          </a:p>
+          <a:p>
+            <a:r>
+              <a:rPr lang="en-US" altLang="zh-CN" dirty="0" err="1" smtClean="0"/>
+              <a:t>Application.properties</a:t>
+            </a:r>
+            <a:r>
+              <a:rPr lang="zh-CN" altLang="en-US" dirty="0" smtClean="0"/>
+              <a:t>的解析由</a:t>
+            </a:r>
+            <a:r>
+              <a:rPr lang="en-US" altLang="zh-CN" dirty="0" err="1" smtClean="0"/>
+              <a:t>ContextLoaderListener</a:t>
+            </a:r>
+            <a:r>
+              <a:rPr lang="zh-CN" altLang="en-US" dirty="0" smtClean="0"/>
+              <a:t>和</a:t>
+            </a:r>
+            <a:r>
+              <a:rPr lang="en-US" altLang="zh-CN" dirty="0" smtClean="0"/>
+              <a:t>DispatcherServlet</a:t>
+            </a:r>
+            <a:r>
+              <a:rPr lang="zh-CN" altLang="en-US" dirty="0" smtClean="0"/>
+              <a:t>共同完成。</a:t>
+            </a:r>
+            <a:endParaRPr lang="en-US" altLang="zh-CN" dirty="0" smtClean="0"/>
+          </a:p>
+          <a:p>
+            <a:r>
+              <a:rPr lang="zh-CN" altLang="en-US" dirty="0" smtClean="0"/>
+              <a:t>如果没有</a:t>
+            </a:r>
+            <a:r>
+              <a:rPr lang="en-US" altLang="zh-CN" dirty="0" smtClean="0"/>
+              <a:t>springboot</a:t>
+            </a:r>
+            <a:r>
+              <a:rPr lang="zh-CN" altLang="en-US" dirty="0" smtClean="0"/>
+              <a:t>：绿色的部分的集成就没有了，通过</a:t>
+            </a:r>
+            <a:r>
+              <a:rPr lang="en-US" altLang="zh-CN" dirty="0" smtClean="0"/>
+              <a:t>web.xml</a:t>
+            </a:r>
+            <a:r>
+              <a:rPr lang="zh-CN" altLang="en-US" dirty="0" smtClean="0"/>
+              <a:t>配置的</a:t>
+            </a:r>
+            <a:r>
+              <a:rPr lang="en-US" altLang="zh-CN" dirty="0" err="1" smtClean="0"/>
+              <a:t>contextLoaderLisener</a:t>
+            </a:r>
+            <a:r>
+              <a:rPr lang="zh-CN" altLang="en-US" dirty="0" smtClean="0"/>
+              <a:t>加载</a:t>
+            </a:r>
+            <a:r>
+              <a:rPr lang="en-US" altLang="zh-CN" dirty="0" smtClean="0"/>
+              <a:t>spring</a:t>
+            </a:r>
+            <a:r>
+              <a:rPr lang="zh-CN" altLang="en-US" dirty="0" smtClean="0"/>
+              <a:t>上下文，嵌入的东西都独立出来了。</a:t>
+            </a:r>
+            <a:endParaRPr lang="en-US" altLang="zh-CN" dirty="0" smtClean="0"/>
           </a:p>
         </p:txBody>
       </p:sp>
@@ -1706,6 +1671,201 @@
             <a:fld id="{71FE3369-33FF-45DF-AB83-4542779F698D}" type="slidenum">
               <a:rPr lang="zh-CN" altLang="en-US" smtClean="0"/>
               <a:t>6</a:t>
+            </a:fld>
+            <a:endParaRPr lang="zh-CN" altLang="en-US"/>
+          </a:p>
+        </p:txBody>
+      </p:sp>
+    </p:spTree>
+    <p:extLst>
+      <p:ext uri="{BB962C8B-B14F-4D97-AF65-F5344CB8AC3E}">
+        <p14:creationId xmlns:p14="http://schemas.microsoft.com/office/powerpoint/2010/main" val="1421662787"/>
+      </p:ext>
+    </p:extLst>
+  </p:cSld>
+  <p:clrMapOvr>
+    <a:masterClrMapping/>
+  </p:clrMapOvr>
+</p:notes>
+</file>
+
+<file path=ppt/notesSlides/notesSlide7.xml><?xml version="1.0" encoding="utf-8"?>
+<p:notes xmlns:a="http://schemas.openxmlformats.org/drawingml/2006/main" xmlns:r="http://schemas.openxmlformats.org/officeDocument/2006/relationships" xmlns:p="http://schemas.openxmlformats.org/presentationml/2006/main">
+  <p:cSld>
+    <p:spTree>
+      <p:nvGrpSpPr>
+        <p:cNvPr id="1" name=""/>
+        <p:cNvGrpSpPr/>
+        <p:nvPr/>
+      </p:nvGrpSpPr>
+      <p:grpSpPr>
+        <a:xfrm>
+          <a:off x="0" y="0"/>
+          <a:ext cx="0" cy="0"/>
+          <a:chOff x="0" y="0"/>
+          <a:chExt cx="0" cy="0"/>
+        </a:xfrm>
+      </p:grpSpPr>
+      <p:sp>
+        <p:nvSpPr>
+          <p:cNvPr id="2" name="幻灯片图像占位符 1"/>
+          <p:cNvSpPr>
+            <a:spLocks noGrp="1" noRot="1" noChangeAspect="1"/>
+          </p:cNvSpPr>
+          <p:nvPr>
+            <p:ph type="sldImg"/>
+          </p:nvPr>
+        </p:nvSpPr>
+        <p:spPr>
+          <a:xfrm>
+            <a:off x="381000" y="685800"/>
+            <a:ext cx="6096000" cy="3429000"/>
+          </a:xfrm>
+        </p:spPr>
+      </p:sp>
+      <p:sp>
+        <p:nvSpPr>
+          <p:cNvPr id="3" name="备注占位符 2"/>
+          <p:cNvSpPr>
+            <a:spLocks noGrp="1"/>
+          </p:cNvSpPr>
+          <p:nvPr>
+            <p:ph type="body" idx="1"/>
+          </p:nvPr>
+        </p:nvSpPr>
+        <p:spPr/>
+        <p:txBody>
+          <a:bodyPr/>
+          <a:lstStyle/>
+          <a:p>
+            <a:r>
+              <a:rPr lang="en-US" altLang="zh-CN" dirty="0" err="1" smtClean="0"/>
+              <a:t>ContextLoaderListener</a:t>
+            </a:r>
+            <a:r>
+              <a:rPr lang="zh-CN" altLang="en-US" dirty="0" smtClean="0"/>
+              <a:t>初始化的上下文加载的</a:t>
+            </a:r>
+            <a:r>
+              <a:rPr lang="en-US" altLang="zh-CN" dirty="0" smtClean="0"/>
+              <a:t>Bean</a:t>
+            </a:r>
+            <a:r>
+              <a:rPr lang="zh-CN" altLang="en-US" dirty="0" smtClean="0"/>
+              <a:t>是对于整个应用程序共享的，不管是使用什么表现层技术，一般如</a:t>
+            </a:r>
+            <a:r>
+              <a:rPr lang="en-US" altLang="zh-CN" dirty="0" smtClean="0"/>
+              <a:t>DAO</a:t>
+            </a:r>
+            <a:r>
+              <a:rPr lang="zh-CN" altLang="en-US" dirty="0" smtClean="0"/>
+              <a:t>层、</a:t>
+            </a:r>
+            <a:r>
+              <a:rPr lang="en-US" altLang="zh-CN" dirty="0" smtClean="0"/>
+              <a:t>Service</a:t>
+            </a:r>
+            <a:r>
+              <a:rPr lang="zh-CN" altLang="en-US" dirty="0" smtClean="0"/>
+              <a:t>层</a:t>
+            </a:r>
+            <a:r>
+              <a:rPr lang="en-US" altLang="zh-CN" dirty="0" smtClean="0"/>
+              <a:t>Bean</a:t>
+            </a:r>
+            <a:r>
+              <a:rPr lang="zh-CN" altLang="en-US" dirty="0" smtClean="0"/>
+              <a:t>；</a:t>
+            </a:r>
+          </a:p>
+          <a:p>
+            <a:r>
+              <a:rPr lang="en-US" altLang="zh-CN" dirty="0" smtClean="0"/>
+              <a:t>DispatcherServlet</a:t>
+            </a:r>
+            <a:r>
+              <a:rPr lang="zh-CN" altLang="en-US" dirty="0" smtClean="0"/>
+              <a:t>初始化的上下文加载的</a:t>
+            </a:r>
+            <a:r>
+              <a:rPr lang="en-US" altLang="zh-CN" dirty="0" smtClean="0"/>
+              <a:t>Bean</a:t>
+            </a:r>
+            <a:r>
+              <a:rPr lang="zh-CN" altLang="en-US" dirty="0" smtClean="0"/>
+              <a:t>是只对</a:t>
+            </a:r>
+            <a:r>
+              <a:rPr lang="en-US" altLang="zh-CN" dirty="0" smtClean="0"/>
+              <a:t>Spring Web MVC</a:t>
+            </a:r>
+            <a:r>
+              <a:rPr lang="zh-CN" altLang="en-US" dirty="0" smtClean="0"/>
+              <a:t>有效的</a:t>
+            </a:r>
+            <a:r>
+              <a:rPr lang="en-US" altLang="zh-CN" dirty="0" smtClean="0"/>
+              <a:t>Bean</a:t>
+            </a:r>
+            <a:r>
+              <a:rPr lang="zh-CN" altLang="en-US" dirty="0" smtClean="0"/>
+              <a:t>，如</a:t>
+            </a:r>
+            <a:r>
+              <a:rPr lang="en-US" altLang="zh-CN" dirty="0" smtClean="0"/>
+              <a:t>Controller</a:t>
+            </a:r>
+            <a:r>
+              <a:rPr lang="zh-CN" altLang="en-US" dirty="0" smtClean="0"/>
+              <a:t>、</a:t>
+            </a:r>
+            <a:r>
+              <a:rPr lang="en-US" altLang="zh-CN" dirty="0" smtClean="0"/>
+              <a:t>HandlerMapping</a:t>
+            </a:r>
+            <a:r>
+              <a:rPr lang="zh-CN" altLang="en-US" dirty="0" smtClean="0"/>
+              <a:t>、</a:t>
+            </a:r>
+            <a:r>
+              <a:rPr lang="en-US" altLang="zh-CN" dirty="0" smtClean="0"/>
+              <a:t>HandlerAdapter</a:t>
+            </a:r>
+            <a:r>
+              <a:rPr lang="zh-CN" altLang="en-US" dirty="0" smtClean="0"/>
+              <a:t>等等，该初始化上下文应该只加载</a:t>
+            </a:r>
+            <a:r>
+              <a:rPr lang="en-US" altLang="zh-CN" dirty="0" smtClean="0"/>
+              <a:t>Web</a:t>
+            </a:r>
+            <a:r>
+              <a:rPr lang="zh-CN" altLang="en-US" dirty="0" smtClean="0"/>
+              <a:t>相关组件。</a:t>
+            </a:r>
+            <a:endParaRPr lang="zh-CN" altLang="en-US" dirty="0"/>
+          </a:p>
+        </p:txBody>
+      </p:sp>
+      <p:sp>
+        <p:nvSpPr>
+          <p:cNvPr id="4" name="灯片编号占位符 3"/>
+          <p:cNvSpPr>
+            <a:spLocks noGrp="1"/>
+          </p:cNvSpPr>
+          <p:nvPr>
+            <p:ph type="sldNum" sz="quarter" idx="10"/>
+          </p:nvPr>
+        </p:nvSpPr>
+        <p:spPr/>
+        <p:txBody>
+          <a:bodyPr/>
+          <a:lstStyle/>
+          <a:p>
+            <a:fld id="{71FE3369-33FF-45DF-AB83-4542779F698D}" type="slidenum">
+              <a:rPr lang="zh-CN" altLang="en-US" smtClean="0"/>
+              <a:t>7</a:t>
             </a:fld>
             <a:endParaRPr lang="zh-CN" altLang="en-US"/>
           </a:p>
@@ -1905,7 +2065,7 @@
           <a:p>
             <a:fld id="{530820CF-B880-4189-942D-D702A7CBA730}" type="datetimeFigureOut">
               <a:rPr lang="zh-CN" altLang="en-US" smtClean="0"/>
-              <a:t>2017/5/8</a:t>
+              <a:t>2017/7/20</a:t>
             </a:fld>
             <a:endParaRPr lang="zh-CN" altLang="en-US"/>
           </a:p>
@@ -2070,7 +2230,7 @@
           <a:p>
             <a:fld id="{530820CF-B880-4189-942D-D702A7CBA730}" type="datetimeFigureOut">
               <a:rPr lang="zh-CN" altLang="en-US" smtClean="0"/>
-              <a:t>2017/5/8</a:t>
+              <a:t>2017/7/20</a:t>
             </a:fld>
             <a:endParaRPr lang="zh-CN" altLang="en-US"/>
           </a:p>
@@ -2245,7 +2405,7 @@
           <a:p>
             <a:fld id="{530820CF-B880-4189-942D-D702A7CBA730}" type="datetimeFigureOut">
               <a:rPr lang="zh-CN" altLang="en-US" smtClean="0"/>
-              <a:t>2017/5/8</a:t>
+              <a:t>2017/7/20</a:t>
             </a:fld>
             <a:endParaRPr lang="zh-CN" altLang="en-US"/>
           </a:p>
@@ -2410,7 +2570,7 @@
           <a:p>
             <a:fld id="{530820CF-B880-4189-942D-D702A7CBA730}" type="datetimeFigureOut">
               <a:rPr lang="zh-CN" altLang="en-US" smtClean="0"/>
-              <a:t>2017/5/8</a:t>
+              <a:t>2017/7/20</a:t>
             </a:fld>
             <a:endParaRPr lang="zh-CN" altLang="en-US"/>
           </a:p>
@@ -2651,7 +2811,7 @@
           <a:p>
             <a:fld id="{530820CF-B880-4189-942D-D702A7CBA730}" type="datetimeFigureOut">
               <a:rPr lang="zh-CN" altLang="en-US" smtClean="0"/>
-              <a:t>2017/5/8</a:t>
+              <a:t>2017/7/20</a:t>
             </a:fld>
             <a:endParaRPr lang="zh-CN" altLang="en-US"/>
           </a:p>
@@ -2934,7 +3094,7 @@
           <a:p>
             <a:fld id="{530820CF-B880-4189-942D-D702A7CBA730}" type="datetimeFigureOut">
               <a:rPr lang="zh-CN" altLang="en-US" smtClean="0"/>
-              <a:t>2017/5/8</a:t>
+              <a:t>2017/7/20</a:t>
             </a:fld>
             <a:endParaRPr lang="zh-CN" altLang="en-US"/>
           </a:p>
@@ -3351,7 +3511,7 @@
           <a:p>
             <a:fld id="{530820CF-B880-4189-942D-D702A7CBA730}" type="datetimeFigureOut">
               <a:rPr lang="zh-CN" altLang="en-US" smtClean="0"/>
-              <a:t>2017/5/8</a:t>
+              <a:t>2017/7/20</a:t>
             </a:fld>
             <a:endParaRPr lang="zh-CN" altLang="en-US"/>
           </a:p>
@@ -3464,7 +3624,7 @@
           <a:p>
             <a:fld id="{530820CF-B880-4189-942D-D702A7CBA730}" type="datetimeFigureOut">
               <a:rPr lang="zh-CN" altLang="en-US" smtClean="0"/>
-              <a:t>2017/5/8</a:t>
+              <a:t>2017/7/20</a:t>
             </a:fld>
             <a:endParaRPr lang="zh-CN" altLang="en-US"/>
           </a:p>
@@ -3554,7 +3714,7 @@
           <a:p>
             <a:fld id="{530820CF-B880-4189-942D-D702A7CBA730}" type="datetimeFigureOut">
               <a:rPr lang="zh-CN" altLang="en-US" smtClean="0"/>
-              <a:t>2017/5/8</a:t>
+              <a:t>2017/7/20</a:t>
             </a:fld>
             <a:endParaRPr lang="zh-CN" altLang="en-US"/>
           </a:p>
@@ -3826,7 +3986,7 @@
           <a:p>
             <a:fld id="{530820CF-B880-4189-942D-D702A7CBA730}" type="datetimeFigureOut">
               <a:rPr lang="zh-CN" altLang="en-US" smtClean="0"/>
-              <a:t>2017/5/8</a:t>
+              <a:t>2017/7/20</a:t>
             </a:fld>
             <a:endParaRPr lang="zh-CN" altLang="en-US"/>
           </a:p>
@@ -4074,7 +4234,7 @@
           <a:p>
             <a:fld id="{530820CF-B880-4189-942D-D702A7CBA730}" type="datetimeFigureOut">
               <a:rPr lang="zh-CN" altLang="en-US" smtClean="0"/>
-              <a:t>2017/5/8</a:t>
+              <a:t>2017/7/20</a:t>
             </a:fld>
             <a:endParaRPr lang="zh-CN" altLang="en-US"/>
           </a:p>
@@ -4282,7 +4442,7 @@
           <a:p>
             <a:fld id="{530820CF-B880-4189-942D-D702A7CBA730}" type="datetimeFigureOut">
               <a:rPr lang="zh-CN" altLang="en-US" smtClean="0"/>
-              <a:t>2017/5/8</a:t>
+              <a:t>2017/7/20</a:t>
             </a:fld>
             <a:endParaRPr lang="zh-CN" altLang="en-US"/>
           </a:p>
@@ -7998,8 +8158,8 @@
         </p:nvSpPr>
         <p:spPr>
           <a:xfrm>
-            <a:off x="2160180" y="2501253"/>
-            <a:ext cx="4354023" cy="874368"/>
+            <a:off x="2160183" y="2345454"/>
+            <a:ext cx="4354023" cy="370312"/>
           </a:xfrm>
           <a:prstGeom prst="rect">
             <a:avLst/>
@@ -8044,7 +8204,7 @@
         </p:nvSpPr>
         <p:spPr>
           <a:xfrm>
-            <a:off x="2160180" y="1287389"/>
+            <a:off x="2160183" y="1131590"/>
             <a:ext cx="4354022" cy="864096"/>
           </a:xfrm>
           <a:prstGeom prst="rect">
@@ -8093,7 +8253,1631 @@
         </p:nvSpPr>
         <p:spPr>
           <a:xfrm>
-            <a:off x="2747526" y="0"/>
+            <a:off x="0" y="0"/>
+            <a:ext cx="3416320" cy="369332"/>
+          </a:xfrm>
+          <a:prstGeom prst="rect">
+            <a:avLst/>
+          </a:prstGeom>
+        </p:spPr>
+        <p:txBody>
+          <a:bodyPr wrap="none">
+            <a:spAutoFit/>
+          </a:bodyPr>
+          <a:lstStyle/>
+          <a:p>
+            <a:r>
+              <a:rPr lang="zh-CN" altLang="en-US" dirty="0"/>
+              <a:t>基于前后端</a:t>
+            </a:r>
+            <a:r>
+              <a:rPr lang="zh-CN" altLang="en-US" dirty="0" smtClean="0"/>
+              <a:t>分离的请求处理过程</a:t>
+            </a:r>
+            <a:endParaRPr lang="zh-CN" altLang="en-US" dirty="0"/>
+          </a:p>
+        </p:txBody>
+      </p:sp>
+      <p:sp>
+        <p:nvSpPr>
+          <p:cNvPr id="3" name="矩形 2"/>
+          <p:cNvSpPr/>
+          <p:nvPr/>
+        </p:nvSpPr>
+        <p:spPr>
+          <a:xfrm>
+            <a:off x="2726897" y="416678"/>
+            <a:ext cx="3141247" cy="423607"/>
+          </a:xfrm>
+          <a:prstGeom prst="rect">
+            <a:avLst/>
+          </a:prstGeom>
+          <a:solidFill>
+            <a:srgbClr val="BEE395"/>
+          </a:solidFill>
+          <a:ln>
+            <a:noFill/>
+          </a:ln>
+        </p:spPr>
+        <p:style>
+          <a:lnRef idx="2">
+            <a:schemeClr val="accent3"/>
+          </a:lnRef>
+          <a:fillRef idx="1">
+            <a:schemeClr val="lt1"/>
+          </a:fillRef>
+          <a:effectRef idx="0">
+            <a:schemeClr val="accent3"/>
+          </a:effectRef>
+          <a:fontRef idx="minor">
+            <a:schemeClr val="dk1"/>
+          </a:fontRef>
+        </p:style>
+        <p:txBody>
+          <a:bodyPr rtlCol="0" anchor="ctr"/>
+          <a:lstStyle/>
+          <a:p>
+            <a:pPr algn="ctr"/>
+            <a:endParaRPr lang="en-US" altLang="zh-CN" sz="1200" dirty="0" smtClean="0"/>
+          </a:p>
+        </p:txBody>
+      </p:sp>
+      <p:sp>
+        <p:nvSpPr>
+          <p:cNvPr id="4" name="矩形 3"/>
+          <p:cNvSpPr/>
+          <p:nvPr/>
+        </p:nvSpPr>
+        <p:spPr>
+          <a:xfrm>
+            <a:off x="2363780" y="1426388"/>
+            <a:ext cx="933156" cy="288032"/>
+          </a:xfrm>
+          <a:prstGeom prst="rect">
+            <a:avLst/>
+          </a:prstGeom>
+        </p:spPr>
+        <p:style>
+          <a:lnRef idx="2">
+            <a:schemeClr val="accent1"/>
+          </a:lnRef>
+          <a:fillRef idx="1">
+            <a:schemeClr val="lt1"/>
+          </a:fillRef>
+          <a:effectRef idx="0">
+            <a:schemeClr val="accent1"/>
+          </a:effectRef>
+          <a:fontRef idx="minor">
+            <a:schemeClr val="dk1"/>
+          </a:fontRef>
+        </p:style>
+        <p:txBody>
+          <a:bodyPr rtlCol="0" anchor="ctr"/>
+          <a:lstStyle/>
+          <a:p>
+            <a:pPr algn="ctr"/>
+            <a:r>
+              <a:rPr lang="en-US" altLang="zh-CN" sz="1200" dirty="0" smtClean="0"/>
+              <a:t>Filter1</a:t>
+            </a:r>
+            <a:endParaRPr lang="zh-CN" altLang="en-US" sz="1200" dirty="0"/>
+          </a:p>
+        </p:txBody>
+      </p:sp>
+      <p:sp>
+        <p:nvSpPr>
+          <p:cNvPr id="6" name="矩形 5"/>
+          <p:cNvSpPr/>
+          <p:nvPr/>
+        </p:nvSpPr>
+        <p:spPr>
+          <a:xfrm>
+            <a:off x="5358966" y="1419622"/>
+            <a:ext cx="933156" cy="288032"/>
+          </a:xfrm>
+          <a:prstGeom prst="rect">
+            <a:avLst/>
+          </a:prstGeom>
+        </p:spPr>
+        <p:style>
+          <a:lnRef idx="2">
+            <a:schemeClr val="accent1"/>
+          </a:lnRef>
+          <a:fillRef idx="1">
+            <a:schemeClr val="lt1"/>
+          </a:fillRef>
+          <a:effectRef idx="0">
+            <a:schemeClr val="accent1"/>
+          </a:effectRef>
+          <a:fontRef idx="minor">
+            <a:schemeClr val="dk1"/>
+          </a:fontRef>
+        </p:style>
+        <p:txBody>
+          <a:bodyPr rtlCol="0" anchor="ctr"/>
+          <a:lstStyle/>
+          <a:p>
+            <a:pPr algn="ctr"/>
+            <a:r>
+              <a:rPr lang="en-US" altLang="zh-CN" sz="1200" dirty="0" smtClean="0"/>
+              <a:t>FilterN</a:t>
+            </a:r>
+            <a:endParaRPr lang="zh-CN" altLang="en-US" sz="1200" dirty="0"/>
+          </a:p>
+        </p:txBody>
+      </p:sp>
+      <p:sp>
+        <p:nvSpPr>
+          <p:cNvPr id="7" name="矩形 6"/>
+          <p:cNvSpPr/>
+          <p:nvPr/>
+        </p:nvSpPr>
+        <p:spPr>
+          <a:xfrm>
+            <a:off x="3831393" y="1428068"/>
+            <a:ext cx="933156" cy="288032"/>
+          </a:xfrm>
+          <a:prstGeom prst="rect">
+            <a:avLst/>
+          </a:prstGeom>
+        </p:spPr>
+        <p:style>
+          <a:lnRef idx="2">
+            <a:schemeClr val="accent1"/>
+          </a:lnRef>
+          <a:fillRef idx="1">
+            <a:schemeClr val="lt1"/>
+          </a:fillRef>
+          <a:effectRef idx="0">
+            <a:schemeClr val="accent1"/>
+          </a:effectRef>
+          <a:fontRef idx="minor">
+            <a:schemeClr val="dk1"/>
+          </a:fontRef>
+        </p:style>
+        <p:txBody>
+          <a:bodyPr rtlCol="0" anchor="ctr"/>
+          <a:lstStyle/>
+          <a:p>
+            <a:pPr algn="ctr"/>
+            <a:r>
+              <a:rPr lang="en-US" altLang="zh-CN" sz="1200" dirty="0" smtClean="0"/>
+              <a:t>…</a:t>
+            </a:r>
+            <a:endParaRPr lang="zh-CN" altLang="en-US" sz="1200" dirty="0"/>
+          </a:p>
+        </p:txBody>
+      </p:sp>
+      <p:sp>
+        <p:nvSpPr>
+          <p:cNvPr id="13" name="TextBox 12"/>
+          <p:cNvSpPr txBox="1"/>
+          <p:nvPr/>
+        </p:nvSpPr>
+        <p:spPr>
+          <a:xfrm>
+            <a:off x="2843808" y="483518"/>
+            <a:ext cx="558267" cy="276999"/>
+          </a:xfrm>
+          <a:prstGeom prst="rect">
+            <a:avLst/>
+          </a:prstGeom>
+          <a:noFill/>
+        </p:spPr>
+        <p:txBody>
+          <a:bodyPr wrap="square" rtlCol="0">
+            <a:spAutoFit/>
+          </a:bodyPr>
+          <a:lstStyle/>
+          <a:p>
+            <a:r>
+              <a:rPr lang="zh-CN" altLang="en-US" sz="1200" dirty="0" smtClean="0"/>
+              <a:t>前端</a:t>
+            </a:r>
+            <a:endParaRPr lang="zh-CN" altLang="en-US" sz="1200" dirty="0"/>
+          </a:p>
+        </p:txBody>
+      </p:sp>
+      <p:sp>
+        <p:nvSpPr>
+          <p:cNvPr id="14" name="矩形 13"/>
+          <p:cNvSpPr/>
+          <p:nvPr/>
+        </p:nvSpPr>
+        <p:spPr>
+          <a:xfrm>
+            <a:off x="3923928" y="479296"/>
+            <a:ext cx="648072" cy="298371"/>
+          </a:xfrm>
+          <a:prstGeom prst="rect">
+            <a:avLst/>
+          </a:prstGeom>
+        </p:spPr>
+        <p:style>
+          <a:lnRef idx="2">
+            <a:schemeClr val="accent3"/>
+          </a:lnRef>
+          <a:fillRef idx="1">
+            <a:schemeClr val="lt1"/>
+          </a:fillRef>
+          <a:effectRef idx="0">
+            <a:schemeClr val="accent3"/>
+          </a:effectRef>
+          <a:fontRef idx="minor">
+            <a:schemeClr val="dk1"/>
+          </a:fontRef>
+        </p:style>
+        <p:txBody>
+          <a:bodyPr rtlCol="0" anchor="ctr"/>
+          <a:lstStyle/>
+          <a:p>
+            <a:pPr algn="ctr"/>
+            <a:r>
+              <a:rPr lang="zh-CN" altLang="en-US" sz="1200" dirty="0"/>
+              <a:t>浏览器</a:t>
+            </a:r>
+            <a:endParaRPr lang="en-US" altLang="zh-CN" sz="1200" dirty="0"/>
+          </a:p>
+        </p:txBody>
+      </p:sp>
+      <p:sp>
+        <p:nvSpPr>
+          <p:cNvPr id="15" name="矩形 14"/>
+          <p:cNvSpPr/>
+          <p:nvPr/>
+        </p:nvSpPr>
+        <p:spPr>
+          <a:xfrm>
+            <a:off x="4958332" y="479296"/>
+            <a:ext cx="648072" cy="306847"/>
+          </a:xfrm>
+          <a:prstGeom prst="rect">
+            <a:avLst/>
+          </a:prstGeom>
+        </p:spPr>
+        <p:style>
+          <a:lnRef idx="2">
+            <a:schemeClr val="accent3"/>
+          </a:lnRef>
+          <a:fillRef idx="1">
+            <a:schemeClr val="lt1"/>
+          </a:fillRef>
+          <a:effectRef idx="0">
+            <a:schemeClr val="accent3"/>
+          </a:effectRef>
+          <a:fontRef idx="minor">
+            <a:schemeClr val="dk1"/>
+          </a:fontRef>
+        </p:style>
+        <p:txBody>
+          <a:bodyPr rtlCol="0" anchor="ctr"/>
+          <a:lstStyle/>
+          <a:p>
+            <a:pPr algn="ctr"/>
+            <a:r>
+              <a:rPr lang="zh-CN" altLang="en-US" sz="1200" dirty="0" smtClean="0"/>
+              <a:t>移动端</a:t>
+            </a:r>
+            <a:endParaRPr lang="en-US" altLang="zh-CN" sz="1200" dirty="0"/>
+          </a:p>
+        </p:txBody>
+      </p:sp>
+      <p:sp>
+        <p:nvSpPr>
+          <p:cNvPr id="19" name="矩形 18"/>
+          <p:cNvSpPr/>
+          <p:nvPr/>
+        </p:nvSpPr>
+        <p:spPr>
+          <a:xfrm>
+            <a:off x="3661511" y="2372275"/>
+            <a:ext cx="1272015" cy="276999"/>
+          </a:xfrm>
+          <a:prstGeom prst="rect">
+            <a:avLst/>
+          </a:prstGeom>
+        </p:spPr>
+        <p:txBody>
+          <a:bodyPr wrap="none">
+            <a:spAutoFit/>
+          </a:bodyPr>
+          <a:lstStyle/>
+          <a:p>
+            <a:r>
+              <a:rPr lang="en-US" altLang="zh-CN" sz="1200" dirty="0" smtClean="0"/>
+              <a:t>dispatcherServlet</a:t>
+            </a:r>
+            <a:endParaRPr lang="zh-CN" altLang="en-US" sz="1200" dirty="0"/>
+          </a:p>
+        </p:txBody>
+      </p:sp>
+      <p:sp>
+        <p:nvSpPr>
+          <p:cNvPr id="22" name="矩形 21"/>
+          <p:cNvSpPr/>
+          <p:nvPr/>
+        </p:nvSpPr>
+        <p:spPr>
+          <a:xfrm>
+            <a:off x="2880045" y="3537906"/>
+            <a:ext cx="2952328" cy="377900"/>
+          </a:xfrm>
+          <a:prstGeom prst="rect">
+            <a:avLst/>
+          </a:prstGeom>
+          <a:solidFill>
+            <a:schemeClr val="bg1">
+              <a:lumMod val="95000"/>
+            </a:schemeClr>
+          </a:solidFill>
+          <a:ln w="9525">
+            <a:solidFill>
+              <a:schemeClr val="bg1">
+                <a:lumMod val="50000"/>
+              </a:schemeClr>
+            </a:solidFill>
+            <a:prstDash val="dash"/>
+          </a:ln>
+        </p:spPr>
+        <p:style>
+          <a:lnRef idx="2">
+            <a:schemeClr val="accent1">
+              <a:shade val="50000"/>
+            </a:schemeClr>
+          </a:lnRef>
+          <a:fillRef idx="1">
+            <a:schemeClr val="accent1"/>
+          </a:fillRef>
+          <a:effectRef idx="0">
+            <a:schemeClr val="accent1"/>
+          </a:effectRef>
+          <a:fontRef idx="minor">
+            <a:schemeClr val="lt1"/>
+          </a:fontRef>
+        </p:style>
+        <p:txBody>
+          <a:bodyPr rtlCol="0" anchor="ctr"/>
+          <a:lstStyle/>
+          <a:p>
+            <a:pPr lvl="0" algn="ctr"/>
+            <a:r>
+              <a:rPr lang="en-US" altLang="zh-CN" sz="1200" dirty="0" smtClean="0">
+                <a:solidFill>
+                  <a:prstClr val="black"/>
+                </a:solidFill>
+              </a:rPr>
+              <a:t>Controllers (handler)</a:t>
+            </a:r>
+            <a:endParaRPr lang="en-US" altLang="zh-CN" sz="1200" dirty="0">
+              <a:solidFill>
+                <a:prstClr val="black"/>
+              </a:solidFill>
+            </a:endParaRPr>
+          </a:p>
+        </p:txBody>
+      </p:sp>
+      <p:sp>
+        <p:nvSpPr>
+          <p:cNvPr id="23" name="矩形 22"/>
+          <p:cNvSpPr/>
+          <p:nvPr/>
+        </p:nvSpPr>
+        <p:spPr>
+          <a:xfrm>
+            <a:off x="3106014" y="4114840"/>
+            <a:ext cx="2500390" cy="360040"/>
+          </a:xfrm>
+          <a:prstGeom prst="rect">
+            <a:avLst/>
+          </a:prstGeom>
+          <a:solidFill>
+            <a:schemeClr val="bg1">
+              <a:lumMod val="95000"/>
+            </a:schemeClr>
+          </a:solidFill>
+          <a:ln w="9525">
+            <a:solidFill>
+              <a:schemeClr val="bg1">
+                <a:lumMod val="50000"/>
+              </a:schemeClr>
+            </a:solidFill>
+            <a:prstDash val="dash"/>
+          </a:ln>
+        </p:spPr>
+        <p:style>
+          <a:lnRef idx="2">
+            <a:schemeClr val="accent1">
+              <a:shade val="50000"/>
+            </a:schemeClr>
+          </a:lnRef>
+          <a:fillRef idx="1">
+            <a:schemeClr val="accent1"/>
+          </a:fillRef>
+          <a:effectRef idx="0">
+            <a:schemeClr val="accent1"/>
+          </a:effectRef>
+          <a:fontRef idx="minor">
+            <a:schemeClr val="lt1"/>
+          </a:fontRef>
+        </p:style>
+        <p:txBody>
+          <a:bodyPr rtlCol="0" anchor="ctr"/>
+          <a:lstStyle/>
+          <a:p>
+            <a:pPr lvl="0" algn="ctr"/>
+            <a:r>
+              <a:rPr lang="en-US" altLang="zh-CN" sz="1200" dirty="0" smtClean="0">
+                <a:solidFill>
+                  <a:prstClr val="black"/>
+                </a:solidFill>
+              </a:rPr>
+              <a:t>Services</a:t>
+            </a:r>
+            <a:endParaRPr lang="zh-CN" altLang="en-US" sz="1200" dirty="0">
+              <a:solidFill>
+                <a:prstClr val="black"/>
+              </a:solidFill>
+            </a:endParaRPr>
+          </a:p>
+        </p:txBody>
+      </p:sp>
+      <p:sp>
+        <p:nvSpPr>
+          <p:cNvPr id="25" name="圆柱形 24"/>
+          <p:cNvSpPr/>
+          <p:nvPr/>
+        </p:nvSpPr>
+        <p:spPr>
+          <a:xfrm>
+            <a:off x="4051228" y="4701987"/>
+            <a:ext cx="609961" cy="390043"/>
+          </a:xfrm>
+          <a:prstGeom prst="can">
+            <a:avLst/>
+          </a:prstGeom>
+          <a:solidFill>
+            <a:schemeClr val="bg1">
+              <a:lumMod val="95000"/>
+            </a:schemeClr>
+          </a:solidFill>
+          <a:ln w="12700">
+            <a:solidFill>
+              <a:schemeClr val="bg1">
+                <a:lumMod val="50000"/>
+              </a:schemeClr>
+            </a:solidFill>
+            <a:prstDash val="dash"/>
+          </a:ln>
+        </p:spPr>
+        <p:style>
+          <a:lnRef idx="2">
+            <a:schemeClr val="accent5"/>
+          </a:lnRef>
+          <a:fillRef idx="1">
+            <a:schemeClr val="lt1"/>
+          </a:fillRef>
+          <a:effectRef idx="0">
+            <a:schemeClr val="accent5"/>
+          </a:effectRef>
+          <a:fontRef idx="minor">
+            <a:schemeClr val="dk1"/>
+          </a:fontRef>
+        </p:style>
+        <p:txBody>
+          <a:bodyPr rtlCol="0" anchor="ctr"/>
+          <a:lstStyle/>
+          <a:p>
+            <a:pPr algn="ctr"/>
+            <a:r>
+              <a:rPr lang="en-US" altLang="zh-CN" sz="1200" dirty="0" smtClean="0"/>
+              <a:t>DB</a:t>
+            </a:r>
+            <a:endParaRPr lang="zh-CN" altLang="en-US" sz="1200" dirty="0"/>
+          </a:p>
+        </p:txBody>
+      </p:sp>
+      <p:cxnSp>
+        <p:nvCxnSpPr>
+          <p:cNvPr id="16" name="直接箭头连接符 15"/>
+          <p:cNvCxnSpPr/>
+          <p:nvPr/>
+        </p:nvCxnSpPr>
+        <p:spPr>
+          <a:xfrm>
+            <a:off x="3859895" y="840285"/>
+            <a:ext cx="0" cy="440382"/>
+          </a:xfrm>
+          <a:prstGeom prst="straightConnector1">
+            <a:avLst/>
+          </a:prstGeom>
+          <a:ln>
+            <a:headEnd type="none" w="med" len="med"/>
+            <a:tailEnd type="none" w="med" len="med"/>
+          </a:ln>
+        </p:spPr>
+        <p:style>
+          <a:lnRef idx="1">
+            <a:schemeClr val="accent1"/>
+          </a:lnRef>
+          <a:fillRef idx="0">
+            <a:schemeClr val="accent1"/>
+          </a:fillRef>
+          <a:effectRef idx="0">
+            <a:schemeClr val="accent1"/>
+          </a:effectRef>
+          <a:fontRef idx="minor">
+            <a:schemeClr val="tx1"/>
+          </a:fontRef>
+        </p:style>
+      </p:cxnSp>
+      <p:cxnSp>
+        <p:nvCxnSpPr>
+          <p:cNvPr id="24" name="直接箭头连接符 23"/>
+          <p:cNvCxnSpPr/>
+          <p:nvPr/>
+        </p:nvCxnSpPr>
+        <p:spPr>
+          <a:xfrm>
+            <a:off x="3853561" y="1851670"/>
+            <a:ext cx="6333" cy="493784"/>
+          </a:xfrm>
+          <a:prstGeom prst="straightConnector1">
+            <a:avLst/>
+          </a:prstGeom>
+          <a:ln>
+            <a:tailEnd type="arrow"/>
+          </a:ln>
+        </p:spPr>
+        <p:style>
+          <a:lnRef idx="1">
+            <a:schemeClr val="accent1"/>
+          </a:lnRef>
+          <a:fillRef idx="0">
+            <a:schemeClr val="accent1"/>
+          </a:fillRef>
+          <a:effectRef idx="0">
+            <a:schemeClr val="accent1"/>
+          </a:effectRef>
+          <a:fontRef idx="minor">
+            <a:schemeClr val="tx1"/>
+          </a:fontRef>
+        </p:style>
+      </p:cxnSp>
+      <p:cxnSp>
+        <p:nvCxnSpPr>
+          <p:cNvPr id="26" name="直接箭头连接符 25"/>
+          <p:cNvCxnSpPr/>
+          <p:nvPr/>
+        </p:nvCxnSpPr>
+        <p:spPr>
+          <a:xfrm>
+            <a:off x="3856727" y="3079813"/>
+            <a:ext cx="3167" cy="458093"/>
+          </a:xfrm>
+          <a:prstGeom prst="straightConnector1">
+            <a:avLst/>
+          </a:prstGeom>
+          <a:ln>
+            <a:prstDash val="dash"/>
+            <a:tailEnd type="arrow"/>
+          </a:ln>
+        </p:spPr>
+        <p:style>
+          <a:lnRef idx="1">
+            <a:schemeClr val="accent1"/>
+          </a:lnRef>
+          <a:fillRef idx="0">
+            <a:schemeClr val="accent1"/>
+          </a:fillRef>
+          <a:effectRef idx="0">
+            <a:schemeClr val="accent1"/>
+          </a:effectRef>
+          <a:fontRef idx="minor">
+            <a:schemeClr val="tx1"/>
+          </a:fontRef>
+        </p:style>
+      </p:cxnSp>
+      <p:cxnSp>
+        <p:nvCxnSpPr>
+          <p:cNvPr id="35" name="肘形连接符 34"/>
+          <p:cNvCxnSpPr/>
+          <p:nvPr/>
+        </p:nvCxnSpPr>
+        <p:spPr>
+          <a:xfrm rot="10800000" flipV="1">
+            <a:off x="2848376" y="2345454"/>
+            <a:ext cx="1020105" cy="303819"/>
+          </a:xfrm>
+          <a:prstGeom prst="bentConnector2">
+            <a:avLst/>
+          </a:prstGeom>
+          <a:ln>
+            <a:tailEnd type="arrow"/>
+          </a:ln>
+        </p:spPr>
+        <p:style>
+          <a:lnRef idx="1">
+            <a:schemeClr val="accent1"/>
+          </a:lnRef>
+          <a:fillRef idx="0">
+            <a:schemeClr val="accent1"/>
+          </a:fillRef>
+          <a:effectRef idx="0">
+            <a:schemeClr val="accent1"/>
+          </a:effectRef>
+          <a:fontRef idx="minor">
+            <a:schemeClr val="tx1"/>
+          </a:fontRef>
+        </p:style>
+      </p:cxnSp>
+      <p:cxnSp>
+        <p:nvCxnSpPr>
+          <p:cNvPr id="47" name="肘形连接符 46"/>
+          <p:cNvCxnSpPr/>
+          <p:nvPr/>
+        </p:nvCxnSpPr>
+        <p:spPr>
+          <a:xfrm rot="5400000">
+            <a:off x="4759782" y="2031087"/>
+            <a:ext cx="142507" cy="1954945"/>
+          </a:xfrm>
+          <a:prstGeom prst="bentConnector2">
+            <a:avLst/>
+          </a:prstGeom>
+          <a:ln>
+            <a:prstDash val="dash"/>
+            <a:headEnd type="none" w="med" len="med"/>
+            <a:tailEnd type="none" w="med" len="med"/>
+          </a:ln>
+        </p:spPr>
+        <p:style>
+          <a:lnRef idx="1">
+            <a:schemeClr val="accent1"/>
+          </a:lnRef>
+          <a:fillRef idx="0">
+            <a:schemeClr val="accent1"/>
+          </a:fillRef>
+          <a:effectRef idx="0">
+            <a:schemeClr val="accent1"/>
+          </a:effectRef>
+          <a:fontRef idx="minor">
+            <a:schemeClr val="tx1"/>
+          </a:fontRef>
+        </p:style>
+      </p:cxnSp>
+      <p:cxnSp>
+        <p:nvCxnSpPr>
+          <p:cNvPr id="55" name="直接箭头连接符 54"/>
+          <p:cNvCxnSpPr/>
+          <p:nvPr/>
+        </p:nvCxnSpPr>
+        <p:spPr>
+          <a:xfrm>
+            <a:off x="4192004" y="3915806"/>
+            <a:ext cx="8587" cy="199034"/>
+          </a:xfrm>
+          <a:prstGeom prst="straightConnector1">
+            <a:avLst/>
+          </a:prstGeom>
+          <a:ln>
+            <a:prstDash val="dash"/>
+            <a:tailEnd type="arrow"/>
+          </a:ln>
+        </p:spPr>
+        <p:style>
+          <a:lnRef idx="1">
+            <a:schemeClr val="accent1"/>
+          </a:lnRef>
+          <a:fillRef idx="0">
+            <a:schemeClr val="accent1"/>
+          </a:fillRef>
+          <a:effectRef idx="0">
+            <a:schemeClr val="accent1"/>
+          </a:effectRef>
+          <a:fontRef idx="minor">
+            <a:schemeClr val="tx1"/>
+          </a:fontRef>
+        </p:style>
+      </p:cxnSp>
+      <p:cxnSp>
+        <p:nvCxnSpPr>
+          <p:cNvPr id="57" name="直接箭头连接符 56"/>
+          <p:cNvCxnSpPr/>
+          <p:nvPr/>
+        </p:nvCxnSpPr>
+        <p:spPr>
+          <a:xfrm>
+            <a:off x="4211960" y="4474880"/>
+            <a:ext cx="0" cy="257110"/>
+          </a:xfrm>
+          <a:prstGeom prst="straightConnector1">
+            <a:avLst/>
+          </a:prstGeom>
+          <a:ln>
+            <a:prstDash val="dash"/>
+            <a:tailEnd type="arrow"/>
+          </a:ln>
+        </p:spPr>
+        <p:style>
+          <a:lnRef idx="1">
+            <a:schemeClr val="accent1"/>
+          </a:lnRef>
+          <a:fillRef idx="0">
+            <a:schemeClr val="accent1"/>
+          </a:fillRef>
+          <a:effectRef idx="0">
+            <a:schemeClr val="accent1"/>
+          </a:effectRef>
+          <a:fontRef idx="minor">
+            <a:schemeClr val="tx1"/>
+          </a:fontRef>
+        </p:style>
+      </p:cxnSp>
+      <p:cxnSp>
+        <p:nvCxnSpPr>
+          <p:cNvPr id="59" name="直接箭头连接符 58"/>
+          <p:cNvCxnSpPr/>
+          <p:nvPr/>
+        </p:nvCxnSpPr>
+        <p:spPr>
+          <a:xfrm flipV="1">
+            <a:off x="4499992" y="4474880"/>
+            <a:ext cx="0" cy="227107"/>
+          </a:xfrm>
+          <a:prstGeom prst="straightConnector1">
+            <a:avLst/>
+          </a:prstGeom>
+          <a:ln>
+            <a:prstDash val="dash"/>
+            <a:tailEnd type="arrow"/>
+          </a:ln>
+        </p:spPr>
+        <p:style>
+          <a:lnRef idx="1">
+            <a:schemeClr val="accent6"/>
+          </a:lnRef>
+          <a:fillRef idx="0">
+            <a:schemeClr val="accent6"/>
+          </a:fillRef>
+          <a:effectRef idx="0">
+            <a:schemeClr val="accent6"/>
+          </a:effectRef>
+          <a:fontRef idx="minor">
+            <a:schemeClr val="tx1"/>
+          </a:fontRef>
+        </p:style>
+      </p:cxnSp>
+      <p:cxnSp>
+        <p:nvCxnSpPr>
+          <p:cNvPr id="61" name="直接箭头连接符 60"/>
+          <p:cNvCxnSpPr/>
+          <p:nvPr/>
+        </p:nvCxnSpPr>
+        <p:spPr>
+          <a:xfrm flipV="1">
+            <a:off x="4499992" y="3915806"/>
+            <a:ext cx="0" cy="199034"/>
+          </a:xfrm>
+          <a:prstGeom prst="straightConnector1">
+            <a:avLst/>
+          </a:prstGeom>
+          <a:ln>
+            <a:prstDash val="dash"/>
+            <a:tailEnd type="arrow"/>
+          </a:ln>
+        </p:spPr>
+        <p:style>
+          <a:lnRef idx="1">
+            <a:schemeClr val="accent6"/>
+          </a:lnRef>
+          <a:fillRef idx="0">
+            <a:schemeClr val="accent6"/>
+          </a:fillRef>
+          <a:effectRef idx="0">
+            <a:schemeClr val="accent6"/>
+          </a:effectRef>
+          <a:fontRef idx="minor">
+            <a:schemeClr val="tx1"/>
+          </a:fontRef>
+        </p:style>
+      </p:cxnSp>
+      <p:sp>
+        <p:nvSpPr>
+          <p:cNvPr id="62" name="矩形 61"/>
+          <p:cNvSpPr/>
+          <p:nvPr/>
+        </p:nvSpPr>
+        <p:spPr>
+          <a:xfrm>
+            <a:off x="3706687" y="3170359"/>
+            <a:ext cx="1182568" cy="276999"/>
+          </a:xfrm>
+          <a:prstGeom prst="rect">
+            <a:avLst/>
+          </a:prstGeom>
+        </p:spPr>
+        <p:txBody>
+          <a:bodyPr wrap="none">
+            <a:spAutoFit/>
+          </a:bodyPr>
+          <a:lstStyle/>
+          <a:p>
+            <a:r>
+              <a:rPr lang="en-US" altLang="zh-CN" sz="1200" dirty="0" smtClean="0"/>
+              <a:t>HandlerAdapter</a:t>
+            </a:r>
+            <a:endParaRPr lang="zh-CN" altLang="en-US" sz="1200" dirty="0"/>
+          </a:p>
+        </p:txBody>
+      </p:sp>
+      <p:cxnSp>
+        <p:nvCxnSpPr>
+          <p:cNvPr id="64" name="直接箭头连接符 63"/>
+          <p:cNvCxnSpPr/>
+          <p:nvPr/>
+        </p:nvCxnSpPr>
+        <p:spPr>
+          <a:xfrm flipV="1">
+            <a:off x="4764549" y="3219823"/>
+            <a:ext cx="0" cy="318083"/>
+          </a:xfrm>
+          <a:prstGeom prst="straightConnector1">
+            <a:avLst/>
+          </a:prstGeom>
+          <a:ln>
+            <a:prstDash val="dash"/>
+            <a:tailEnd type="arrow"/>
+          </a:ln>
+        </p:spPr>
+        <p:style>
+          <a:lnRef idx="1">
+            <a:schemeClr val="accent6"/>
+          </a:lnRef>
+          <a:fillRef idx="0">
+            <a:schemeClr val="accent6"/>
+          </a:fillRef>
+          <a:effectRef idx="0">
+            <a:schemeClr val="accent6"/>
+          </a:effectRef>
+          <a:fontRef idx="minor">
+            <a:schemeClr val="tx1"/>
+          </a:fontRef>
+        </p:style>
+      </p:cxnSp>
+      <p:cxnSp>
+        <p:nvCxnSpPr>
+          <p:cNvPr id="66" name="直接箭头连接符 65"/>
+          <p:cNvCxnSpPr/>
+          <p:nvPr/>
+        </p:nvCxnSpPr>
+        <p:spPr>
+          <a:xfrm flipV="1">
+            <a:off x="4764549" y="1995686"/>
+            <a:ext cx="0" cy="349768"/>
+          </a:xfrm>
+          <a:prstGeom prst="straightConnector1">
+            <a:avLst/>
+          </a:prstGeom>
+          <a:ln>
+            <a:headEnd type="none" w="med" len="med"/>
+            <a:tailEnd type="none" w="med" len="med"/>
+          </a:ln>
+        </p:spPr>
+        <p:style>
+          <a:lnRef idx="1">
+            <a:schemeClr val="accent6"/>
+          </a:lnRef>
+          <a:fillRef idx="0">
+            <a:schemeClr val="accent6"/>
+          </a:fillRef>
+          <a:effectRef idx="0">
+            <a:schemeClr val="accent6"/>
+          </a:effectRef>
+          <a:fontRef idx="minor">
+            <a:schemeClr val="tx1"/>
+          </a:fontRef>
+        </p:style>
+      </p:cxnSp>
+      <p:cxnSp>
+        <p:nvCxnSpPr>
+          <p:cNvPr id="70" name="肘形连接符 69"/>
+          <p:cNvCxnSpPr>
+            <a:endCxn id="4" idx="0"/>
+          </p:cNvCxnSpPr>
+          <p:nvPr/>
+        </p:nvCxnSpPr>
+        <p:spPr>
+          <a:xfrm rot="10800000" flipV="1">
+            <a:off x="2830359" y="1280668"/>
+            <a:ext cx="1035211" cy="145719"/>
+          </a:xfrm>
+          <a:prstGeom prst="bentConnector2">
+            <a:avLst/>
+          </a:prstGeom>
+          <a:ln>
+            <a:tailEnd type="arrow"/>
+          </a:ln>
+        </p:spPr>
+        <p:style>
+          <a:lnRef idx="1">
+            <a:schemeClr val="accent1"/>
+          </a:lnRef>
+          <a:fillRef idx="0">
+            <a:schemeClr val="accent1"/>
+          </a:fillRef>
+          <a:effectRef idx="0">
+            <a:schemeClr val="accent1"/>
+          </a:effectRef>
+          <a:fontRef idx="minor">
+            <a:schemeClr val="tx1"/>
+          </a:fontRef>
+        </p:style>
+      </p:cxnSp>
+      <p:cxnSp>
+        <p:nvCxnSpPr>
+          <p:cNvPr id="72" name="直接箭头连接符 71"/>
+          <p:cNvCxnSpPr/>
+          <p:nvPr/>
+        </p:nvCxnSpPr>
+        <p:spPr>
+          <a:xfrm>
+            <a:off x="3296936" y="1633966"/>
+            <a:ext cx="534457" cy="1680"/>
+          </a:xfrm>
+          <a:prstGeom prst="straightConnector1">
+            <a:avLst/>
+          </a:prstGeom>
+          <a:ln>
+            <a:tailEnd type="arrow"/>
+          </a:ln>
+        </p:spPr>
+        <p:style>
+          <a:lnRef idx="1">
+            <a:schemeClr val="accent1"/>
+          </a:lnRef>
+          <a:fillRef idx="0">
+            <a:schemeClr val="accent1"/>
+          </a:fillRef>
+          <a:effectRef idx="0">
+            <a:schemeClr val="accent1"/>
+          </a:effectRef>
+          <a:fontRef idx="minor">
+            <a:schemeClr val="tx1"/>
+          </a:fontRef>
+        </p:style>
+      </p:cxnSp>
+      <p:cxnSp>
+        <p:nvCxnSpPr>
+          <p:cNvPr id="74" name="直接箭头连接符 73"/>
+          <p:cNvCxnSpPr/>
+          <p:nvPr/>
+        </p:nvCxnSpPr>
+        <p:spPr>
+          <a:xfrm flipV="1">
+            <a:off x="4764549" y="1627200"/>
+            <a:ext cx="594417" cy="8446"/>
+          </a:xfrm>
+          <a:prstGeom prst="straightConnector1">
+            <a:avLst/>
+          </a:prstGeom>
+          <a:ln>
+            <a:tailEnd type="arrow"/>
+          </a:ln>
+        </p:spPr>
+        <p:style>
+          <a:lnRef idx="1">
+            <a:schemeClr val="accent1"/>
+          </a:lnRef>
+          <a:fillRef idx="0">
+            <a:schemeClr val="accent1"/>
+          </a:fillRef>
+          <a:effectRef idx="0">
+            <a:schemeClr val="accent1"/>
+          </a:effectRef>
+          <a:fontRef idx="minor">
+            <a:schemeClr val="tx1"/>
+          </a:fontRef>
+        </p:style>
+      </p:cxnSp>
+      <p:cxnSp>
+        <p:nvCxnSpPr>
+          <p:cNvPr id="78" name="肘形连接符 77"/>
+          <p:cNvCxnSpPr>
+            <a:stCxn id="6" idx="2"/>
+          </p:cNvCxnSpPr>
+          <p:nvPr/>
+        </p:nvCxnSpPr>
+        <p:spPr>
+          <a:xfrm rot="5400000">
+            <a:off x="4767545" y="793671"/>
+            <a:ext cx="144016" cy="1971983"/>
+          </a:xfrm>
+          <a:prstGeom prst="bentConnector2">
+            <a:avLst/>
+          </a:prstGeom>
+          <a:ln>
+            <a:tailEnd type="arrow"/>
+          </a:ln>
+        </p:spPr>
+        <p:style>
+          <a:lnRef idx="1">
+            <a:schemeClr val="accent1"/>
+          </a:lnRef>
+          <a:fillRef idx="0">
+            <a:schemeClr val="accent1"/>
+          </a:fillRef>
+          <a:effectRef idx="0">
+            <a:schemeClr val="accent1"/>
+          </a:effectRef>
+          <a:fontRef idx="minor">
+            <a:schemeClr val="tx1"/>
+          </a:fontRef>
+        </p:style>
+      </p:cxnSp>
+      <p:cxnSp>
+        <p:nvCxnSpPr>
+          <p:cNvPr id="20" name="直接连接符 19"/>
+          <p:cNvCxnSpPr/>
+          <p:nvPr/>
+        </p:nvCxnSpPr>
+        <p:spPr>
+          <a:xfrm>
+            <a:off x="4764549" y="1995686"/>
+            <a:ext cx="1175603" cy="0"/>
+          </a:xfrm>
+          <a:prstGeom prst="line">
+            <a:avLst/>
+          </a:prstGeom>
+        </p:spPr>
+        <p:style>
+          <a:lnRef idx="1">
+            <a:schemeClr val="accent6"/>
+          </a:lnRef>
+          <a:fillRef idx="0">
+            <a:schemeClr val="accent6"/>
+          </a:fillRef>
+          <a:effectRef idx="0">
+            <a:schemeClr val="accent6"/>
+          </a:effectRef>
+          <a:fontRef idx="minor">
+            <a:schemeClr val="tx1"/>
+          </a:fontRef>
+        </p:style>
+      </p:cxnSp>
+      <p:cxnSp>
+        <p:nvCxnSpPr>
+          <p:cNvPr id="27" name="直接箭头连接符 26"/>
+          <p:cNvCxnSpPr/>
+          <p:nvPr/>
+        </p:nvCxnSpPr>
+        <p:spPr>
+          <a:xfrm flipV="1">
+            <a:off x="5940152" y="1716100"/>
+            <a:ext cx="0" cy="279586"/>
+          </a:xfrm>
+          <a:prstGeom prst="straightConnector1">
+            <a:avLst/>
+          </a:prstGeom>
+          <a:ln>
+            <a:tailEnd type="arrow"/>
+          </a:ln>
+        </p:spPr>
+        <p:style>
+          <a:lnRef idx="1">
+            <a:schemeClr val="accent6"/>
+          </a:lnRef>
+          <a:fillRef idx="0">
+            <a:schemeClr val="accent6"/>
+          </a:fillRef>
+          <a:effectRef idx="0">
+            <a:schemeClr val="accent6"/>
+          </a:effectRef>
+          <a:fontRef idx="minor">
+            <a:schemeClr val="tx1"/>
+          </a:fontRef>
+        </p:style>
+      </p:cxnSp>
+      <p:cxnSp>
+        <p:nvCxnSpPr>
+          <p:cNvPr id="31" name="直接箭头连接符 30"/>
+          <p:cNvCxnSpPr/>
+          <p:nvPr/>
+        </p:nvCxnSpPr>
+        <p:spPr>
+          <a:xfrm flipH="1">
+            <a:off x="4764549" y="1491630"/>
+            <a:ext cx="577380" cy="1681"/>
+          </a:xfrm>
+          <a:prstGeom prst="straightConnector1">
+            <a:avLst/>
+          </a:prstGeom>
+          <a:ln>
+            <a:tailEnd type="arrow"/>
+          </a:ln>
+        </p:spPr>
+        <p:style>
+          <a:lnRef idx="1">
+            <a:schemeClr val="accent6"/>
+          </a:lnRef>
+          <a:fillRef idx="0">
+            <a:schemeClr val="accent6"/>
+          </a:fillRef>
+          <a:effectRef idx="0">
+            <a:schemeClr val="accent6"/>
+          </a:effectRef>
+          <a:fontRef idx="minor">
+            <a:schemeClr val="tx1"/>
+          </a:fontRef>
+        </p:style>
+      </p:cxnSp>
+      <p:cxnSp>
+        <p:nvCxnSpPr>
+          <p:cNvPr id="37" name="直接箭头连接符 36"/>
+          <p:cNvCxnSpPr/>
+          <p:nvPr/>
+        </p:nvCxnSpPr>
+        <p:spPr>
+          <a:xfrm flipH="1">
+            <a:off x="3275857" y="1491630"/>
+            <a:ext cx="549806" cy="0"/>
+          </a:xfrm>
+          <a:prstGeom prst="straightConnector1">
+            <a:avLst/>
+          </a:prstGeom>
+          <a:ln>
+            <a:tailEnd type="arrow"/>
+          </a:ln>
+        </p:spPr>
+        <p:style>
+          <a:lnRef idx="1">
+            <a:schemeClr val="accent6"/>
+          </a:lnRef>
+          <a:fillRef idx="0">
+            <a:schemeClr val="accent6"/>
+          </a:fillRef>
+          <a:effectRef idx="0">
+            <a:schemeClr val="accent6"/>
+          </a:effectRef>
+          <a:fontRef idx="minor">
+            <a:schemeClr val="tx1"/>
+          </a:fontRef>
+        </p:style>
+      </p:cxnSp>
+      <p:cxnSp>
+        <p:nvCxnSpPr>
+          <p:cNvPr id="42" name="直接连接符 41"/>
+          <p:cNvCxnSpPr/>
+          <p:nvPr/>
+        </p:nvCxnSpPr>
+        <p:spPr>
+          <a:xfrm flipV="1">
+            <a:off x="2987824" y="1347614"/>
+            <a:ext cx="0" cy="78773"/>
+          </a:xfrm>
+          <a:prstGeom prst="line">
+            <a:avLst/>
+          </a:prstGeom>
+        </p:spPr>
+        <p:style>
+          <a:lnRef idx="1">
+            <a:schemeClr val="accent6"/>
+          </a:lnRef>
+          <a:fillRef idx="0">
+            <a:schemeClr val="accent6"/>
+          </a:fillRef>
+          <a:effectRef idx="0">
+            <a:schemeClr val="accent6"/>
+          </a:effectRef>
+          <a:fontRef idx="minor">
+            <a:schemeClr val="tx1"/>
+          </a:fontRef>
+        </p:style>
+      </p:cxnSp>
+      <p:cxnSp>
+        <p:nvCxnSpPr>
+          <p:cNvPr id="46" name="直接连接符 45"/>
+          <p:cNvCxnSpPr/>
+          <p:nvPr/>
+        </p:nvCxnSpPr>
+        <p:spPr>
+          <a:xfrm>
+            <a:off x="2987824" y="1347614"/>
+            <a:ext cx="2016224" cy="0"/>
+          </a:xfrm>
+          <a:prstGeom prst="line">
+            <a:avLst/>
+          </a:prstGeom>
+        </p:spPr>
+        <p:style>
+          <a:lnRef idx="1">
+            <a:schemeClr val="accent6"/>
+          </a:lnRef>
+          <a:fillRef idx="0">
+            <a:schemeClr val="accent6"/>
+          </a:fillRef>
+          <a:effectRef idx="0">
+            <a:schemeClr val="accent6"/>
+          </a:effectRef>
+          <a:fontRef idx="minor">
+            <a:schemeClr val="tx1"/>
+          </a:fontRef>
+        </p:style>
+      </p:cxnSp>
+      <p:cxnSp>
+        <p:nvCxnSpPr>
+          <p:cNvPr id="49" name="直接箭头连接符 48"/>
+          <p:cNvCxnSpPr/>
+          <p:nvPr/>
+        </p:nvCxnSpPr>
+        <p:spPr>
+          <a:xfrm flipV="1">
+            <a:off x="5004048" y="840285"/>
+            <a:ext cx="0" cy="507329"/>
+          </a:xfrm>
+          <a:prstGeom prst="straightConnector1">
+            <a:avLst/>
+          </a:prstGeom>
+          <a:ln>
+            <a:tailEnd type="arrow"/>
+          </a:ln>
+        </p:spPr>
+        <p:style>
+          <a:lnRef idx="1">
+            <a:schemeClr val="accent6"/>
+          </a:lnRef>
+          <a:fillRef idx="0">
+            <a:schemeClr val="accent6"/>
+          </a:fillRef>
+          <a:effectRef idx="0">
+            <a:schemeClr val="accent6"/>
+          </a:effectRef>
+          <a:fontRef idx="minor">
+            <a:schemeClr val="tx1"/>
+          </a:fontRef>
+        </p:style>
+      </p:cxnSp>
+      <p:sp>
+        <p:nvSpPr>
+          <p:cNvPr id="50" name="TextBox 49"/>
+          <p:cNvSpPr txBox="1"/>
+          <p:nvPr/>
+        </p:nvSpPr>
+        <p:spPr>
+          <a:xfrm>
+            <a:off x="5061757" y="854591"/>
+            <a:ext cx="753283" cy="276999"/>
+          </a:xfrm>
+          <a:prstGeom prst="rect">
+            <a:avLst/>
+          </a:prstGeom>
+          <a:noFill/>
+        </p:spPr>
+        <p:txBody>
+          <a:bodyPr wrap="none" rtlCol="0">
+            <a:spAutoFit/>
+          </a:bodyPr>
+          <a:lstStyle/>
+          <a:p>
+            <a:r>
+              <a:rPr lang="en-US" altLang="zh-CN" sz="1200" dirty="0" smtClean="0">
+                <a:solidFill>
+                  <a:schemeClr val="accent6">
+                    <a:lumMod val="75000"/>
+                  </a:schemeClr>
+                </a:solidFill>
+              </a:rPr>
+              <a:t>response</a:t>
+            </a:r>
+            <a:endParaRPr lang="zh-CN" altLang="en-US" sz="1200" dirty="0">
+              <a:solidFill>
+                <a:schemeClr val="accent6">
+                  <a:lumMod val="75000"/>
+                </a:schemeClr>
+              </a:solidFill>
+            </a:endParaRPr>
+          </a:p>
+        </p:txBody>
+      </p:sp>
+      <p:sp>
+        <p:nvSpPr>
+          <p:cNvPr id="63" name="TextBox 62"/>
+          <p:cNvSpPr txBox="1"/>
+          <p:nvPr/>
+        </p:nvSpPr>
+        <p:spPr>
+          <a:xfrm>
+            <a:off x="3100887" y="854591"/>
+            <a:ext cx="660181" cy="276999"/>
+          </a:xfrm>
+          <a:prstGeom prst="rect">
+            <a:avLst/>
+          </a:prstGeom>
+          <a:noFill/>
+        </p:spPr>
+        <p:txBody>
+          <a:bodyPr wrap="none" rtlCol="0">
+            <a:spAutoFit/>
+          </a:bodyPr>
+          <a:lstStyle/>
+          <a:p>
+            <a:r>
+              <a:rPr lang="en-US" altLang="zh-CN" sz="1200" dirty="0" smtClean="0">
+                <a:solidFill>
+                  <a:schemeClr val="tx2">
+                    <a:lumMod val="75000"/>
+                  </a:schemeClr>
+                </a:solidFill>
+              </a:rPr>
+              <a:t>request</a:t>
+            </a:r>
+            <a:endParaRPr lang="zh-CN" altLang="en-US" sz="1200" dirty="0">
+              <a:solidFill>
+                <a:schemeClr val="tx2">
+                  <a:lumMod val="75000"/>
+                </a:schemeClr>
+              </a:solidFill>
+            </a:endParaRPr>
+          </a:p>
+        </p:txBody>
+      </p:sp>
+      <p:sp>
+        <p:nvSpPr>
+          <p:cNvPr id="65" name="TextBox 64"/>
+          <p:cNvSpPr txBox="1"/>
+          <p:nvPr/>
+        </p:nvSpPr>
+        <p:spPr>
+          <a:xfrm>
+            <a:off x="3129403" y="2032070"/>
+            <a:ext cx="660181" cy="276999"/>
+          </a:xfrm>
+          <a:prstGeom prst="rect">
+            <a:avLst/>
+          </a:prstGeom>
+          <a:noFill/>
+        </p:spPr>
+        <p:txBody>
+          <a:bodyPr wrap="none" rtlCol="0">
+            <a:spAutoFit/>
+          </a:bodyPr>
+          <a:lstStyle/>
+          <a:p>
+            <a:r>
+              <a:rPr lang="en-US" altLang="zh-CN" sz="1200" dirty="0" smtClean="0">
+                <a:solidFill>
+                  <a:schemeClr val="tx2">
+                    <a:lumMod val="75000"/>
+                  </a:schemeClr>
+                </a:solidFill>
+              </a:rPr>
+              <a:t>request</a:t>
+            </a:r>
+            <a:endParaRPr lang="zh-CN" altLang="en-US" sz="1200" dirty="0">
+              <a:solidFill>
+                <a:schemeClr val="tx2">
+                  <a:lumMod val="75000"/>
+                </a:schemeClr>
+              </a:solidFill>
+            </a:endParaRPr>
+          </a:p>
+        </p:txBody>
+      </p:sp>
+      <p:sp>
+        <p:nvSpPr>
+          <p:cNvPr id="69" name="TextBox 68"/>
+          <p:cNvSpPr txBox="1"/>
+          <p:nvPr/>
+        </p:nvSpPr>
+        <p:spPr>
+          <a:xfrm>
+            <a:off x="4831779" y="2032069"/>
+            <a:ext cx="753283" cy="276999"/>
+          </a:xfrm>
+          <a:prstGeom prst="rect">
+            <a:avLst/>
+          </a:prstGeom>
+          <a:noFill/>
+        </p:spPr>
+        <p:txBody>
+          <a:bodyPr wrap="none" rtlCol="0">
+            <a:spAutoFit/>
+          </a:bodyPr>
+          <a:lstStyle/>
+          <a:p>
+            <a:r>
+              <a:rPr lang="en-US" altLang="zh-CN" sz="1200" dirty="0" smtClean="0">
+                <a:solidFill>
+                  <a:schemeClr val="accent6">
+                    <a:lumMod val="75000"/>
+                  </a:schemeClr>
+                </a:solidFill>
+              </a:rPr>
+              <a:t>response</a:t>
+            </a:r>
+            <a:endParaRPr lang="zh-CN" altLang="en-US" sz="1200" dirty="0">
+              <a:solidFill>
+                <a:schemeClr val="accent6">
+                  <a:lumMod val="75000"/>
+                </a:schemeClr>
+              </a:solidFill>
+            </a:endParaRPr>
+          </a:p>
+        </p:txBody>
+      </p:sp>
+      <p:sp>
+        <p:nvSpPr>
+          <p:cNvPr id="51" name="矩形 50"/>
+          <p:cNvSpPr/>
+          <p:nvPr/>
+        </p:nvSpPr>
+        <p:spPr>
+          <a:xfrm>
+            <a:off x="3300916" y="2802814"/>
+            <a:ext cx="2590068" cy="276999"/>
+          </a:xfrm>
+          <a:prstGeom prst="rect">
+            <a:avLst/>
+          </a:prstGeom>
+        </p:spPr>
+        <p:txBody>
+          <a:bodyPr wrap="none">
+            <a:spAutoFit/>
+          </a:bodyPr>
+          <a:lstStyle/>
+          <a:p>
+            <a:r>
+              <a:rPr lang="en-US" altLang="zh-CN" sz="1200" dirty="0" err="1" smtClean="0"/>
+              <a:t>RequestHandlerMapping</a:t>
+            </a:r>
+            <a:r>
+              <a:rPr lang="en-US" altLang="zh-CN" sz="1200" dirty="0" smtClean="0"/>
+              <a:t>: interceptor</a:t>
+            </a:r>
+            <a:endParaRPr lang="zh-CN" altLang="en-US" sz="1200" dirty="0"/>
+          </a:p>
+        </p:txBody>
+      </p:sp>
+    </p:spTree>
+    <p:extLst>
+      <p:ext uri="{BB962C8B-B14F-4D97-AF65-F5344CB8AC3E}">
+        <p14:creationId xmlns:p14="http://schemas.microsoft.com/office/powerpoint/2010/main" val="2525437369"/>
+      </p:ext>
+    </p:extLst>
+  </p:cSld>
+  <p:clrMapOvr>
+    <a:masterClrMapping/>
+  </p:clrMapOvr>
+  <p:timing>
+    <p:tnLst>
+      <p:par>
+        <p:cTn id="1" dur="indefinite" restart="never" nodeType="tmRoot"/>
+      </p:par>
+    </p:tnLst>
+  </p:timing>
+</p:sld>
+</file>
+
+<file path=ppt/slides/slide5.xml><?xml version="1.0" encoding="utf-8"?>
+<p:sld xmlns:a="http://schemas.openxmlformats.org/drawingml/2006/main" xmlns:r="http://schemas.openxmlformats.org/officeDocument/2006/relationships" xmlns:p="http://schemas.openxmlformats.org/presentationml/2006/main">
+  <p:cSld>
+    <p:spTree>
+      <p:nvGrpSpPr>
+        <p:cNvPr id="1" name=""/>
+        <p:cNvGrpSpPr/>
+        <p:nvPr/>
+      </p:nvGrpSpPr>
+      <p:grpSpPr>
+        <a:xfrm>
+          <a:off x="0" y="0"/>
+          <a:ext cx="0" cy="0"/>
+          <a:chOff x="0" y="0"/>
+          <a:chExt cx="0" cy="0"/>
+        </a:xfrm>
+      </p:grpSpPr>
+      <p:sp>
+        <p:nvSpPr>
+          <p:cNvPr id="12" name="矩形 11"/>
+          <p:cNvSpPr/>
+          <p:nvPr/>
+        </p:nvSpPr>
+        <p:spPr>
+          <a:xfrm>
+            <a:off x="792031" y="2633486"/>
+            <a:ext cx="4354023" cy="874368"/>
+          </a:xfrm>
+          <a:prstGeom prst="rect">
+            <a:avLst/>
+          </a:prstGeom>
+          <a:solidFill>
+            <a:srgbClr val="DFC9EF"/>
+          </a:solidFill>
+          <a:ln>
+            <a:noFill/>
+          </a:ln>
+        </p:spPr>
+        <p:style>
+          <a:lnRef idx="2">
+            <a:schemeClr val="accent1">
+              <a:shade val="50000"/>
+            </a:schemeClr>
+          </a:lnRef>
+          <a:fillRef idx="1">
+            <a:schemeClr val="accent1"/>
+          </a:fillRef>
+          <a:effectRef idx="0">
+            <a:schemeClr val="accent1"/>
+          </a:effectRef>
+          <a:fontRef idx="minor">
+            <a:schemeClr val="lt1"/>
+          </a:fontRef>
+        </p:style>
+        <p:txBody>
+          <a:bodyPr rtlCol="0" anchor="ctr"/>
+          <a:lstStyle/>
+          <a:p>
+            <a:pPr algn="ctr"/>
+            <a:endParaRPr lang="zh-CN" altLang="en-US" dirty="0"/>
+          </a:p>
+        </p:txBody>
+      </p:sp>
+      <p:sp>
+        <p:nvSpPr>
+          <p:cNvPr id="8" name="矩形 7"/>
+          <p:cNvSpPr/>
+          <p:nvPr/>
+        </p:nvSpPr>
+        <p:spPr>
+          <a:xfrm>
+            <a:off x="792031" y="1419622"/>
+            <a:ext cx="4354022" cy="864096"/>
+          </a:xfrm>
+          <a:prstGeom prst="rect">
+            <a:avLst/>
+          </a:prstGeom>
+          <a:solidFill>
+            <a:schemeClr val="accent1">
+              <a:lumMod val="20000"/>
+              <a:lumOff val="80000"/>
+            </a:schemeClr>
+          </a:solidFill>
+          <a:ln>
+            <a:noFill/>
+          </a:ln>
+        </p:spPr>
+        <p:style>
+          <a:lnRef idx="2">
+            <a:schemeClr val="accent1">
+              <a:shade val="50000"/>
+            </a:schemeClr>
+          </a:lnRef>
+          <a:fillRef idx="1">
+            <a:schemeClr val="accent1"/>
+          </a:fillRef>
+          <a:effectRef idx="0">
+            <a:schemeClr val="accent1"/>
+          </a:effectRef>
+          <a:fontRef idx="minor">
+            <a:schemeClr val="lt1"/>
+          </a:fontRef>
+        </p:style>
+        <p:txBody>
+          <a:bodyPr rtlCol="0" anchor="ctr"/>
+          <a:lstStyle/>
+          <a:p>
+            <a:pPr algn="ctr"/>
+            <a:endParaRPr lang="zh-CN" altLang="en-US"/>
+          </a:p>
+        </p:txBody>
+      </p:sp>
+      <p:sp>
+        <p:nvSpPr>
+          <p:cNvPr id="2" name="矩形 1"/>
+          <p:cNvSpPr/>
+          <p:nvPr/>
+        </p:nvSpPr>
+        <p:spPr>
+          <a:xfrm>
+            <a:off x="1379377" y="132233"/>
             <a:ext cx="3100884" cy="369332"/>
           </a:xfrm>
           <a:prstGeom prst="rect">
@@ -8116,11 +9900,7 @@
             </a:r>
             <a:r>
               <a:rPr lang="zh-CN" altLang="en-US" dirty="0" smtClean="0"/>
-              <a:t>架构的请求处理</a:t>
-            </a:r>
-            <a:r>
-              <a:rPr lang="zh-CN" altLang="en-US" dirty="0" smtClean="0"/>
-              <a:t>过程</a:t>
+              <a:t>架构的请求处理过程</a:t>
             </a:r>
             <a:endParaRPr lang="zh-CN" altLang="en-US" dirty="0"/>
           </a:p>
@@ -8134,7 +9914,7 @@
         </p:nvSpPr>
         <p:spPr>
           <a:xfrm>
-            <a:off x="2726894" y="572477"/>
+            <a:off x="1358745" y="704710"/>
             <a:ext cx="3141247" cy="423607"/>
           </a:xfrm>
           <a:prstGeom prst="rect">
@@ -8181,7 +9961,7 @@
         </p:nvSpPr>
         <p:spPr>
           <a:xfrm>
-            <a:off x="2363777" y="1582187"/>
+            <a:off x="995628" y="1714420"/>
             <a:ext cx="933156" cy="288032"/>
           </a:xfrm>
           <a:prstGeom prst="rect">
@@ -8223,7 +10003,7 @@
         </p:nvSpPr>
         <p:spPr>
           <a:xfrm>
-            <a:off x="5358963" y="1575421"/>
+            <a:off x="3990814" y="1707654"/>
             <a:ext cx="933156" cy="288032"/>
           </a:xfrm>
           <a:prstGeom prst="rect">
@@ -8265,7 +10045,7 @@
         </p:nvSpPr>
         <p:spPr>
           <a:xfrm>
-            <a:off x="3831390" y="1583867"/>
+            <a:off x="2463241" y="1716100"/>
             <a:ext cx="933156" cy="288032"/>
           </a:xfrm>
           <a:prstGeom prst="rect">
@@ -8307,7 +10087,7 @@
         </p:nvSpPr>
         <p:spPr>
           <a:xfrm>
-            <a:off x="2381794" y="2805073"/>
+            <a:off x="1013645" y="2937306"/>
             <a:ext cx="933156" cy="288032"/>
           </a:xfrm>
           <a:prstGeom prst="rect">
@@ -8349,7 +10129,7 @@
         </p:nvSpPr>
         <p:spPr>
           <a:xfrm>
-            <a:off x="3859891" y="2805073"/>
+            <a:off x="2491742" y="2937306"/>
             <a:ext cx="933156" cy="288032"/>
           </a:xfrm>
           <a:prstGeom prst="rect">
@@ -8391,7 +10171,7 @@
         </p:nvSpPr>
         <p:spPr>
           <a:xfrm>
-            <a:off x="5341926" y="2805073"/>
+            <a:off x="3973777" y="2937306"/>
             <a:ext cx="933156" cy="288032"/>
           </a:xfrm>
           <a:prstGeom prst="rect">
@@ -8433,7 +10213,7 @@
         </p:nvSpPr>
         <p:spPr>
           <a:xfrm>
-            <a:off x="2776131" y="635095"/>
+            <a:off x="1407982" y="767328"/>
             <a:ext cx="817703" cy="276999"/>
           </a:xfrm>
           <a:prstGeom prst="rect">
@@ -8527,7 +10307,7 @@
         </p:nvSpPr>
         <p:spPr>
           <a:xfrm>
-            <a:off x="3923925" y="635095"/>
+            <a:off x="2555776" y="767328"/>
             <a:ext cx="648072" cy="298371"/>
           </a:xfrm>
           <a:prstGeom prst="rect">
@@ -8569,7 +10349,7 @@
         </p:nvSpPr>
         <p:spPr>
           <a:xfrm>
-            <a:off x="4958329" y="635095"/>
+            <a:off x="3590180" y="767328"/>
             <a:ext cx="648072" cy="306847"/>
           </a:xfrm>
           <a:prstGeom prst="rect">
@@ -8611,8 +10391,8 @@
         </p:nvSpPr>
         <p:spPr>
           <a:xfrm>
-            <a:off x="3661508" y="2528074"/>
-            <a:ext cx="1272015" cy="276999"/>
+            <a:off x="1891731" y="2660307"/>
+            <a:ext cx="2278701" cy="276999"/>
           </a:xfrm>
           <a:prstGeom prst="rect">
             <a:avLst/>
@@ -8628,6 +10408,18 @@
               <a:rPr lang="en-US" altLang="zh-CN" sz="1200" dirty="0" smtClean="0"/>
               <a:t>dispatcherServlet</a:t>
             </a:r>
+            <a:r>
+              <a:rPr lang="zh-CN" altLang="en-US" sz="1200" dirty="0" smtClean="0"/>
+              <a:t>（</a:t>
+            </a:r>
+            <a:r>
+              <a:rPr lang="en-US" altLang="zh-CN" sz="1200" dirty="0" smtClean="0"/>
+              <a:t>Spring</a:t>
+            </a:r>
+            <a:r>
+              <a:rPr lang="zh-CN" altLang="en-US" sz="1200" dirty="0" smtClean="0"/>
+              <a:t>封装）</a:t>
+            </a:r>
             <a:endParaRPr lang="zh-CN" altLang="en-US" sz="1200" dirty="0"/>
           </a:p>
         </p:txBody>
@@ -8640,7 +10432,7 @@
         </p:nvSpPr>
         <p:spPr>
           <a:xfrm>
-            <a:off x="3418781" y="3693705"/>
+            <a:off x="2050632" y="3825938"/>
             <a:ext cx="1789636" cy="377900"/>
           </a:xfrm>
           <a:prstGeom prst="rect">
@@ -8705,7 +10497,7 @@
         </p:nvSpPr>
         <p:spPr>
           <a:xfrm>
-            <a:off x="3406956" y="4263862"/>
+            <a:off x="2038807" y="4396095"/>
             <a:ext cx="1801461" cy="360040"/>
           </a:xfrm>
           <a:prstGeom prst="rect">
@@ -8770,7 +10562,7 @@
         </p:nvSpPr>
         <p:spPr>
           <a:xfrm>
-            <a:off x="5736890" y="4263862"/>
+            <a:off x="4368741" y="4396095"/>
             <a:ext cx="609961" cy="390043"/>
           </a:xfrm>
           <a:prstGeom prst="can">
@@ -8825,7 +10617,7 @@
         </p:nvCxnSpPr>
         <p:spPr>
           <a:xfrm>
-            <a:off x="3859892" y="996084"/>
+            <a:off x="2491743" y="1128317"/>
             <a:ext cx="0" cy="440382"/>
           </a:xfrm>
           <a:prstGeom prst="straightConnector1">
@@ -8859,7 +10651,7 @@
         </p:nvCxnSpPr>
         <p:spPr>
           <a:xfrm>
-            <a:off x="3853558" y="2007469"/>
+            <a:off x="2485409" y="2139702"/>
             <a:ext cx="6333" cy="493784"/>
           </a:xfrm>
           <a:prstGeom prst="straightConnector1">
@@ -8893,7 +10685,7 @@
         </p:nvCxnSpPr>
         <p:spPr>
           <a:xfrm>
-            <a:off x="3856724" y="3235612"/>
+            <a:off x="2488575" y="3367845"/>
             <a:ext cx="3167" cy="458093"/>
           </a:xfrm>
           <a:prstGeom prst="straightConnector1">
@@ -8929,7 +10721,7 @@
         </p:nvCxnSpPr>
         <p:spPr>
           <a:xfrm rot="10800000" flipV="1">
-            <a:off x="2848373" y="2501253"/>
+            <a:off x="1480224" y="2633486"/>
             <a:ext cx="1020105" cy="303819"/>
           </a:xfrm>
           <a:prstGeom prst="bentConnector2">
@@ -8965,7 +10757,7 @@
         </p:nvCxnSpPr>
         <p:spPr>
           <a:xfrm>
-            <a:off x="3314950" y="2949089"/>
+            <a:off x="1946801" y="3081322"/>
             <a:ext cx="544941" cy="0"/>
           </a:xfrm>
           <a:prstGeom prst="straightConnector1">
@@ -9001,7 +10793,7 @@
         </p:nvCxnSpPr>
         <p:spPr>
           <a:xfrm>
-            <a:off x="4793047" y="2949089"/>
+            <a:off x="3424898" y="3081322"/>
             <a:ext cx="548879" cy="0"/>
           </a:xfrm>
           <a:prstGeom prst="straightConnector1">
@@ -9036,7 +10828,7 @@
         </p:nvCxnSpPr>
         <p:spPr>
           <a:xfrm rot="5400000">
-            <a:off x="4759779" y="2186886"/>
+            <a:off x="3391630" y="2319119"/>
             <a:ext cx="142507" cy="1954945"/>
           </a:xfrm>
           <a:prstGeom prst="bentConnector2">
@@ -9071,7 +10863,7 @@
         </p:nvCxnSpPr>
         <p:spPr>
           <a:xfrm>
-            <a:off x="4192001" y="4071605"/>
+            <a:off x="2823852" y="4203838"/>
             <a:ext cx="8587" cy="199034"/>
           </a:xfrm>
           <a:prstGeom prst="straightConnector1">
@@ -9105,7 +10897,7 @@
         </p:nvCxnSpPr>
         <p:spPr>
           <a:xfrm>
-            <a:off x="5208843" y="4373165"/>
+            <a:off x="3840694" y="4505398"/>
             <a:ext cx="528047" cy="0"/>
           </a:xfrm>
           <a:prstGeom prst="straightConnector1">
@@ -9139,7 +10931,7 @@
         </p:nvCxnSpPr>
         <p:spPr>
           <a:xfrm flipH="1">
-            <a:off x="5208418" y="4527749"/>
+            <a:off x="3840269" y="4659982"/>
             <a:ext cx="528472" cy="0"/>
           </a:xfrm>
           <a:prstGeom prst="straightConnector1">
@@ -9173,7 +10965,7 @@
         </p:nvCxnSpPr>
         <p:spPr>
           <a:xfrm flipV="1">
-            <a:off x="4499989" y="4071605"/>
+            <a:off x="3131840" y="4203838"/>
             <a:ext cx="0" cy="199034"/>
           </a:xfrm>
           <a:prstGeom prst="straightConnector1">
@@ -9207,7 +10999,7 @@
         </p:nvSpPr>
         <p:spPr>
           <a:xfrm>
-            <a:off x="3663000" y="3375621"/>
+            <a:off x="2294851" y="3507854"/>
             <a:ext cx="1182568" cy="276999"/>
           </a:xfrm>
           <a:prstGeom prst="rect">
@@ -9236,7 +11028,7 @@
         </p:nvCxnSpPr>
         <p:spPr>
           <a:xfrm flipV="1">
-            <a:off x="4764546" y="3375622"/>
+            <a:off x="3396397" y="3507855"/>
             <a:ext cx="0" cy="318083"/>
           </a:xfrm>
           <a:prstGeom prst="straightConnector1">
@@ -9270,7 +11062,7 @@
         </p:nvCxnSpPr>
         <p:spPr>
           <a:xfrm flipV="1">
-            <a:off x="4764546" y="2151485"/>
+            <a:off x="3396397" y="2283718"/>
             <a:ext cx="0" cy="349768"/>
           </a:xfrm>
           <a:prstGeom prst="straightConnector1">
@@ -9306,7 +11098,7 @@
         </p:nvCxnSpPr>
         <p:spPr>
           <a:xfrm rot="10800000" flipV="1">
-            <a:off x="2830356" y="1436467"/>
+            <a:off x="1462207" y="1568700"/>
             <a:ext cx="1035211" cy="145719"/>
           </a:xfrm>
           <a:prstGeom prst="bentConnector2">
@@ -9339,7 +11131,7 @@
         </p:nvCxnSpPr>
         <p:spPr>
           <a:xfrm>
-            <a:off x="3296933" y="1789765"/>
+            <a:off x="1928784" y="1921998"/>
             <a:ext cx="534457" cy="1680"/>
           </a:xfrm>
           <a:prstGeom prst="straightConnector1">
@@ -9372,7 +11164,7 @@
         </p:nvCxnSpPr>
         <p:spPr>
           <a:xfrm flipV="1">
-            <a:off x="4764546" y="1782999"/>
+            <a:off x="3396397" y="1915232"/>
             <a:ext cx="594417" cy="8446"/>
           </a:xfrm>
           <a:prstGeom prst="straightConnector1">
@@ -9407,7 +11199,7 @@
         </p:nvCxnSpPr>
         <p:spPr>
           <a:xfrm rot="5400000">
-            <a:off x="4767542" y="949470"/>
+            <a:off x="3399393" y="1081703"/>
             <a:ext cx="144016" cy="1971983"/>
           </a:xfrm>
           <a:prstGeom prst="bentConnector2">
@@ -9440,7 +11232,7 @@
         </p:nvCxnSpPr>
         <p:spPr>
           <a:xfrm>
-            <a:off x="4764546" y="2151485"/>
+            <a:off x="3396397" y="2283718"/>
             <a:ext cx="1175603" cy="0"/>
           </a:xfrm>
           <a:prstGeom prst="line">
@@ -9470,7 +11262,7 @@
         </p:nvCxnSpPr>
         <p:spPr>
           <a:xfrm flipV="1">
-            <a:off x="5940149" y="1871899"/>
+            <a:off x="4572000" y="2004132"/>
             <a:ext cx="0" cy="279586"/>
           </a:xfrm>
           <a:prstGeom prst="straightConnector1">
@@ -9503,7 +11295,7 @@
         </p:nvCxnSpPr>
         <p:spPr>
           <a:xfrm flipH="1">
-            <a:off x="4764546" y="1647429"/>
+            <a:off x="3396397" y="1779662"/>
             <a:ext cx="577380" cy="1681"/>
           </a:xfrm>
           <a:prstGeom prst="straightConnector1">
@@ -9536,7 +11328,7 @@
         </p:nvCxnSpPr>
         <p:spPr>
           <a:xfrm flipH="1">
-            <a:off x="3275854" y="1647429"/>
+            <a:off x="1907705" y="1779662"/>
             <a:ext cx="549806" cy="0"/>
           </a:xfrm>
           <a:prstGeom prst="straightConnector1">
@@ -9569,7 +11361,7 @@
         </p:nvCxnSpPr>
         <p:spPr>
           <a:xfrm flipV="1">
-            <a:off x="2987821" y="1503413"/>
+            <a:off x="1619672" y="1635646"/>
             <a:ext cx="0" cy="78773"/>
           </a:xfrm>
           <a:prstGeom prst="line">
@@ -9599,7 +11391,7 @@
         </p:nvCxnSpPr>
         <p:spPr>
           <a:xfrm>
-            <a:off x="2987821" y="1503413"/>
+            <a:off x="1619672" y="1635646"/>
             <a:ext cx="2016224" cy="0"/>
           </a:xfrm>
           <a:prstGeom prst="line">
@@ -9629,7 +11421,7 @@
         </p:nvCxnSpPr>
         <p:spPr>
           <a:xfrm flipV="1">
-            <a:off x="5004045" y="996084"/>
+            <a:off x="3635896" y="1128317"/>
             <a:ext cx="0" cy="507329"/>
           </a:xfrm>
           <a:prstGeom prst="straightConnector1">
@@ -9662,7 +11454,7 @@
         </p:nvSpPr>
         <p:spPr>
           <a:xfrm>
-            <a:off x="5061754" y="1010390"/>
+            <a:off x="3693605" y="1142623"/>
             <a:ext cx="753283" cy="276999"/>
           </a:xfrm>
           <a:prstGeom prst="rect">
@@ -9704,7 +11496,7 @@
         </p:nvSpPr>
         <p:spPr>
           <a:xfrm>
-            <a:off x="3100884" y="1010390"/>
+            <a:off x="1732735" y="1142623"/>
             <a:ext cx="660181" cy="276999"/>
           </a:xfrm>
           <a:prstGeom prst="rect">
@@ -9746,7 +11538,7 @@
         </p:nvSpPr>
         <p:spPr>
           <a:xfrm>
-            <a:off x="3129400" y="2187869"/>
+            <a:off x="1761251" y="2320102"/>
             <a:ext cx="660181" cy="276999"/>
           </a:xfrm>
           <a:prstGeom prst="rect">
@@ -9788,7 +11580,7 @@
         </p:nvSpPr>
         <p:spPr>
           <a:xfrm>
-            <a:off x="3263744" y="2738582"/>
+            <a:off x="1895595" y="2870815"/>
             <a:ext cx="660181" cy="276999"/>
           </a:xfrm>
           <a:prstGeom prst="rect">
@@ -9830,7 +11622,7 @@
         </p:nvSpPr>
         <p:spPr>
           <a:xfrm>
-            <a:off x="4716013" y="2727549"/>
+            <a:off x="3347864" y="2859782"/>
             <a:ext cx="660181" cy="276999"/>
           </a:xfrm>
           <a:prstGeom prst="rect">
@@ -9872,7 +11664,7 @@
         </p:nvSpPr>
         <p:spPr>
           <a:xfrm>
-            <a:off x="4831776" y="2187868"/>
+            <a:off x="3463627" y="2320101"/>
             <a:ext cx="753283" cy="276999"/>
           </a:xfrm>
           <a:prstGeom prst="rect">
@@ -9914,7 +11706,7 @@
         </p:nvSpPr>
         <p:spPr>
           <a:xfrm>
-            <a:off x="2160180" y="4373165"/>
+            <a:off x="792031" y="4505398"/>
             <a:ext cx="650329" cy="276999"/>
           </a:xfrm>
           <a:prstGeom prst="rect">
@@ -10008,7 +11800,7 @@
         </p:nvSpPr>
         <p:spPr>
           <a:xfrm>
-            <a:off x="2051717" y="1249748"/>
+            <a:off x="683568" y="1381981"/>
             <a:ext cx="4608512" cy="3494025"/>
           </a:xfrm>
           <a:prstGeom prst="rect">
@@ -10047,6 +11839,257 @@
           <a:p>
             <a:pPr algn="ctr"/>
             <a:endParaRPr lang="zh-CN" altLang="en-US"/>
+          </a:p>
+        </p:txBody>
+      </p:sp>
+      <p:sp>
+        <p:nvSpPr>
+          <p:cNvPr id="5" name="TextBox 4"/>
+          <p:cNvSpPr txBox="1"/>
+          <p:nvPr/>
+        </p:nvSpPr>
+        <p:spPr>
+          <a:xfrm>
+            <a:off x="4094233" y="3335281"/>
+            <a:ext cx="466794" cy="261610"/>
+          </a:xfrm>
+          <a:prstGeom prst="rect">
+            <a:avLst/>
+          </a:prstGeom>
+          <a:noFill/>
+        </p:spPr>
+        <p:txBody>
+          <a:bodyPr wrap="none" rtlCol="0">
+            <a:spAutoFit/>
+          </a:bodyPr>
+          <a:lstStyle/>
+          <a:p>
+            <a:r>
+              <a:rPr lang="zh-CN" altLang="en-US" sz="1100" dirty="0" smtClean="0"/>
+              <a:t>调用</a:t>
+            </a:r>
+            <a:endParaRPr lang="zh-CN" altLang="en-US" sz="1100" dirty="0"/>
+          </a:p>
+        </p:txBody>
+      </p:sp>
+      <p:sp>
+        <p:nvSpPr>
+          <p:cNvPr id="18" name="TextBox 17"/>
+          <p:cNvSpPr txBox="1"/>
+          <p:nvPr/>
+        </p:nvSpPr>
+        <p:spPr>
+          <a:xfrm>
+            <a:off x="5352416" y="3406229"/>
+            <a:ext cx="1688796" cy="461665"/>
+          </a:xfrm>
+          <a:prstGeom prst="rect">
+            <a:avLst/>
+          </a:prstGeom>
+          <a:noFill/>
+        </p:spPr>
+        <p:txBody>
+          <a:bodyPr wrap="none" rtlCol="0">
+            <a:spAutoFit/>
+          </a:bodyPr>
+          <a:lstStyle/>
+          <a:p>
+            <a:r>
+              <a:rPr lang="en-US" altLang="zh-CN" sz="1200" dirty="0" smtClean="0"/>
+              <a:t>controller</a:t>
+            </a:r>
+            <a:r>
+              <a:rPr lang="zh-CN" altLang="en-US" sz="1200" dirty="0" smtClean="0"/>
+              <a:t>层的</a:t>
+            </a:r>
+            <a:r>
+              <a:rPr lang="en-US" altLang="zh-CN" sz="1200" dirty="0" smtClean="0"/>
+              <a:t>AOP</a:t>
+            </a:r>
+          </a:p>
+          <a:p>
+            <a:r>
+              <a:rPr lang="zh-CN" altLang="en-US" sz="1200" dirty="0" smtClean="0"/>
+              <a:t>（</a:t>
+            </a:r>
+            <a:r>
+              <a:rPr lang="en-US" altLang="zh-CN" sz="1200" dirty="0" smtClean="0"/>
+              <a:t>HandlerInterceptor</a:t>
+            </a:r>
+            <a:r>
+              <a:rPr lang="zh-CN" altLang="en-US" sz="1200" dirty="0" smtClean="0"/>
+              <a:t>）</a:t>
+            </a:r>
+            <a:endParaRPr lang="zh-CN" altLang="en-US" sz="1200" dirty="0"/>
+          </a:p>
+        </p:txBody>
+      </p:sp>
+      <p:cxnSp>
+        <p:nvCxnSpPr>
+          <p:cNvPr id="28" name="直接箭头连接符 27"/>
+          <p:cNvCxnSpPr>
+            <a:stCxn id="62" idx="3"/>
+            <a:endCxn id="18" idx="1"/>
+          </p:cNvCxnSpPr>
+          <p:nvPr/>
+        </p:nvCxnSpPr>
+        <p:spPr>
+          <a:xfrm flipV="1">
+            <a:off x="3477419" y="3637062"/>
+            <a:ext cx="1874997" cy="9292"/>
+          </a:xfrm>
+          <a:prstGeom prst="straightConnector1">
+            <a:avLst/>
+          </a:prstGeom>
+          <a:ln>
+            <a:prstDash val="sysDash"/>
+            <a:headEnd type="none" w="med" len="med"/>
+            <a:tailEnd type="none" w="med" len="med"/>
+          </a:ln>
+        </p:spPr>
+        <p:style>
+          <a:lnRef idx="1">
+            <a:schemeClr val="accent1"/>
+          </a:lnRef>
+          <a:fillRef idx="0">
+            <a:schemeClr val="accent1"/>
+          </a:fillRef>
+          <a:effectRef idx="0">
+            <a:schemeClr val="accent1"/>
+          </a:effectRef>
+          <a:fontRef idx="minor">
+            <a:schemeClr val="tx1"/>
+          </a:fontRef>
+        </p:style>
+      </p:cxnSp>
+      <p:sp>
+        <p:nvSpPr>
+          <p:cNvPr id="38" name="左大括号 37"/>
+          <p:cNvSpPr/>
+          <p:nvPr/>
+        </p:nvSpPr>
+        <p:spPr>
+          <a:xfrm>
+            <a:off x="6912260" y="3225338"/>
+            <a:ext cx="216024" cy="789550"/>
+          </a:xfrm>
+          <a:prstGeom prst="leftBrace">
+            <a:avLst>
+              <a:gd name="adj1" fmla="val 40079"/>
+              <a:gd name="adj2" fmla="val 50000"/>
+            </a:avLst>
+          </a:prstGeom>
+        </p:spPr>
+        <p:style>
+          <a:lnRef idx="1">
+            <a:schemeClr val="accent1"/>
+          </a:lnRef>
+          <a:fillRef idx="0">
+            <a:schemeClr val="accent1"/>
+          </a:fillRef>
+          <a:effectRef idx="0">
+            <a:schemeClr val="accent1"/>
+          </a:effectRef>
+          <a:fontRef idx="minor">
+            <a:schemeClr val="tx1"/>
+          </a:fontRef>
+        </p:style>
+        <p:txBody>
+          <a:bodyPr rtlCol="0" anchor="ctr"/>
+          <a:lstStyle/>
+          <a:p>
+            <a:pPr algn="ctr"/>
+            <a:endParaRPr lang="zh-CN" altLang="en-US"/>
+          </a:p>
+        </p:txBody>
+      </p:sp>
+      <p:sp>
+        <p:nvSpPr>
+          <p:cNvPr id="39" name="TextBox 38"/>
+          <p:cNvSpPr txBox="1"/>
+          <p:nvPr/>
+        </p:nvSpPr>
+        <p:spPr>
+          <a:xfrm>
+            <a:off x="7164287" y="3093501"/>
+            <a:ext cx="835037" cy="276999"/>
+          </a:xfrm>
+          <a:prstGeom prst="rect">
+            <a:avLst/>
+          </a:prstGeom>
+          <a:noFill/>
+        </p:spPr>
+        <p:txBody>
+          <a:bodyPr wrap="none" rtlCol="0">
+            <a:spAutoFit/>
+          </a:bodyPr>
+          <a:lstStyle/>
+          <a:p>
+            <a:r>
+              <a:rPr lang="en-US" altLang="zh-CN" sz="1200" dirty="0" err="1"/>
+              <a:t>preHandle</a:t>
+            </a:r>
+            <a:endParaRPr lang="zh-CN" altLang="en-US" sz="1200" dirty="0"/>
+          </a:p>
+        </p:txBody>
+      </p:sp>
+      <p:sp>
+        <p:nvSpPr>
+          <p:cNvPr id="71" name="TextBox 70"/>
+          <p:cNvSpPr txBox="1"/>
+          <p:nvPr/>
+        </p:nvSpPr>
+        <p:spPr>
+          <a:xfrm>
+            <a:off x="7164287" y="3507855"/>
+            <a:ext cx="899477" cy="276999"/>
+          </a:xfrm>
+          <a:prstGeom prst="rect">
+            <a:avLst/>
+          </a:prstGeom>
+          <a:noFill/>
+        </p:spPr>
+        <p:txBody>
+          <a:bodyPr wrap="none" rtlCol="0">
+            <a:spAutoFit/>
+          </a:bodyPr>
+          <a:lstStyle/>
+          <a:p>
+            <a:r>
+              <a:rPr lang="en-US" altLang="zh-CN" sz="1200" dirty="0" err="1" smtClean="0"/>
+              <a:t>postHandle</a:t>
+            </a:r>
+            <a:endParaRPr lang="zh-CN" altLang="en-US" sz="1200" dirty="0"/>
+          </a:p>
+        </p:txBody>
+      </p:sp>
+      <p:sp>
+        <p:nvSpPr>
+          <p:cNvPr id="73" name="TextBox 72"/>
+          <p:cNvSpPr txBox="1"/>
+          <p:nvPr/>
+        </p:nvSpPr>
+        <p:spPr>
+          <a:xfrm>
+            <a:off x="7164287" y="3876388"/>
+            <a:ext cx="1210396" cy="276999"/>
+          </a:xfrm>
+          <a:prstGeom prst="rect">
+            <a:avLst/>
+          </a:prstGeom>
+          <a:noFill/>
+        </p:spPr>
+        <p:txBody>
+          <a:bodyPr wrap="none" rtlCol="0">
+            <a:spAutoFit/>
+          </a:bodyPr>
+          <a:lstStyle/>
+          <a:p>
+            <a:r>
+              <a:rPr lang="en-US" altLang="zh-CN" sz="1200" dirty="0" err="1"/>
+              <a:t>afterCompletion</a:t>
+            </a:r>
+            <a:endParaRPr lang="zh-CN" altLang="en-US" sz="1200" dirty="0"/>
           </a:p>
         </p:txBody>
       </p:sp>
@@ -10070,7 +12113,7 @@
 </p:sld>
 </file>
 
-<file path=ppt/slides/slide5.xml><?xml version="1.0" encoding="utf-8"?>
+<file path=ppt/slides/slide6.xml><?xml version="1.0" encoding="utf-8"?>
 <p:sld xmlns:a="http://schemas.openxmlformats.org/drawingml/2006/main" xmlns:r="http://schemas.openxmlformats.org/officeDocument/2006/relationships" xmlns:p="http://schemas.openxmlformats.org/presentationml/2006/main">
   <p:cSld>
     <p:spTree>
@@ -12384,7 +14427,7 @@
 </p:sld>
 </file>
 
-<file path=ppt/slides/slide6.xml><?xml version="1.0" encoding="utf-8"?>
+<file path=ppt/slides/slide7.xml><?xml version="1.0" encoding="utf-8"?>
 <p:sld xmlns:a="http://schemas.openxmlformats.org/drawingml/2006/main" xmlns:r="http://schemas.openxmlformats.org/officeDocument/2006/relationships" xmlns:p="http://schemas.openxmlformats.org/presentationml/2006/main">
   <p:cSld>
     <p:spTree>
@@ -12475,11 +14518,7 @@
             </a:r>
             <a:r>
               <a:rPr lang="zh-CN" altLang="en-US" sz="1600" dirty="0" smtClean="0"/>
-              <a:t>项目的启动</a:t>
-            </a:r>
-            <a:r>
-              <a:rPr lang="zh-CN" altLang="en-US" sz="1600" dirty="0" smtClean="0"/>
-              <a:t>过程</a:t>
+              <a:t>项目的启动过程</a:t>
             </a:r>
             <a:endParaRPr lang="zh-CN" altLang="en-US" sz="1600" dirty="0"/>
           </a:p>

</xml_diff>